<commit_message>
Improved the benchmark result figures
</commit_message>
<xml_diff>
--- a/2018_XtremeCLOUD/Figures/graphs.pptx
+++ b/2018_XtremeCLOUD/Figures/graphs.pptx
@@ -4,9 +4,13 @@
   <p:sldMasterIdLst>
     <p:sldMasterId id="2147483648" r:id="rId1"/>
   </p:sldMasterIdLst>
+  <p:notesMasterIdLst>
+    <p:notesMasterId r:id="rId5"/>
+  </p:notesMasterIdLst>
   <p:sldIdLst>
-    <p:sldId id="400" r:id="rId2"/>
-    <p:sldId id="401" r:id="rId3"/>
+    <p:sldId id="403" r:id="rId2"/>
+    <p:sldId id="400" r:id="rId3"/>
+    <p:sldId id="402" r:id="rId4"/>
   </p:sldIdLst>
   <p:sldSz cx="12192000" cy="6858000"/>
   <p:notesSz cx="6858000" cy="9144000"/>
@@ -14,8 +18,8 @@
     <a:defPPr>
       <a:defRPr lang="en-US"/>
     </a:defPPr>
-    <a:lvl1pPr marL="0" algn="l" defTabSz="914400" rtl="0" eaLnBrk="1" latinLnBrk="0" hangingPunct="1">
-      <a:defRPr sz="1800" kern="1200">
+    <a:lvl1pPr marL="0" algn="l" defTabSz="913992" rtl="0" eaLnBrk="1" latinLnBrk="0" hangingPunct="1">
+      <a:defRPr sz="1799" kern="1200">
         <a:solidFill>
           <a:schemeClr val="tx1"/>
         </a:solidFill>
@@ -24,8 +28,8 @@
         <a:cs typeface="+mn-cs"/>
       </a:defRPr>
     </a:lvl1pPr>
-    <a:lvl2pPr marL="457200" algn="l" defTabSz="914400" rtl="0" eaLnBrk="1" latinLnBrk="0" hangingPunct="1">
-      <a:defRPr sz="1800" kern="1200">
+    <a:lvl2pPr marL="456997" algn="l" defTabSz="913992" rtl="0" eaLnBrk="1" latinLnBrk="0" hangingPunct="1">
+      <a:defRPr sz="1799" kern="1200">
         <a:solidFill>
           <a:schemeClr val="tx1"/>
         </a:solidFill>
@@ -34,8 +38,8 @@
         <a:cs typeface="+mn-cs"/>
       </a:defRPr>
     </a:lvl2pPr>
-    <a:lvl3pPr marL="914400" algn="l" defTabSz="914400" rtl="0" eaLnBrk="1" latinLnBrk="0" hangingPunct="1">
-      <a:defRPr sz="1800" kern="1200">
+    <a:lvl3pPr marL="913992" algn="l" defTabSz="913992" rtl="0" eaLnBrk="1" latinLnBrk="0" hangingPunct="1">
+      <a:defRPr sz="1799" kern="1200">
         <a:solidFill>
           <a:schemeClr val="tx1"/>
         </a:solidFill>
@@ -44,8 +48,8 @@
         <a:cs typeface="+mn-cs"/>
       </a:defRPr>
     </a:lvl3pPr>
-    <a:lvl4pPr marL="1371600" algn="l" defTabSz="914400" rtl="0" eaLnBrk="1" latinLnBrk="0" hangingPunct="1">
-      <a:defRPr sz="1800" kern="1200">
+    <a:lvl4pPr marL="1370989" algn="l" defTabSz="913992" rtl="0" eaLnBrk="1" latinLnBrk="0" hangingPunct="1">
+      <a:defRPr sz="1799" kern="1200">
         <a:solidFill>
           <a:schemeClr val="tx1"/>
         </a:solidFill>
@@ -54,8 +58,8 @@
         <a:cs typeface="+mn-cs"/>
       </a:defRPr>
     </a:lvl4pPr>
-    <a:lvl5pPr marL="1828800" algn="l" defTabSz="914400" rtl="0" eaLnBrk="1" latinLnBrk="0" hangingPunct="1">
-      <a:defRPr sz="1800" kern="1200">
+    <a:lvl5pPr marL="1827984" algn="l" defTabSz="913992" rtl="0" eaLnBrk="1" latinLnBrk="0" hangingPunct="1">
+      <a:defRPr sz="1799" kern="1200">
         <a:solidFill>
           <a:schemeClr val="tx1"/>
         </a:solidFill>
@@ -64,8 +68,8 @@
         <a:cs typeface="+mn-cs"/>
       </a:defRPr>
     </a:lvl5pPr>
-    <a:lvl6pPr marL="2286000" algn="l" defTabSz="914400" rtl="0" eaLnBrk="1" latinLnBrk="0" hangingPunct="1">
-      <a:defRPr sz="1800" kern="1200">
+    <a:lvl6pPr marL="2284981" algn="l" defTabSz="913992" rtl="0" eaLnBrk="1" latinLnBrk="0" hangingPunct="1">
+      <a:defRPr sz="1799" kern="1200">
         <a:solidFill>
           <a:schemeClr val="tx1"/>
         </a:solidFill>
@@ -74,8 +78,8 @@
         <a:cs typeface="+mn-cs"/>
       </a:defRPr>
     </a:lvl6pPr>
-    <a:lvl7pPr marL="2743200" algn="l" defTabSz="914400" rtl="0" eaLnBrk="1" latinLnBrk="0" hangingPunct="1">
-      <a:defRPr sz="1800" kern="1200">
+    <a:lvl7pPr marL="2741976" algn="l" defTabSz="913992" rtl="0" eaLnBrk="1" latinLnBrk="0" hangingPunct="1">
+      <a:defRPr sz="1799" kern="1200">
         <a:solidFill>
           <a:schemeClr val="tx1"/>
         </a:solidFill>
@@ -84,8 +88,8 @@
         <a:cs typeface="+mn-cs"/>
       </a:defRPr>
     </a:lvl7pPr>
-    <a:lvl8pPr marL="3200400" algn="l" defTabSz="914400" rtl="0" eaLnBrk="1" latinLnBrk="0" hangingPunct="1">
-      <a:defRPr sz="1800" kern="1200">
+    <a:lvl8pPr marL="3198973" algn="l" defTabSz="913992" rtl="0" eaLnBrk="1" latinLnBrk="0" hangingPunct="1">
+      <a:defRPr sz="1799" kern="1200">
         <a:solidFill>
           <a:schemeClr val="tx1"/>
         </a:solidFill>
@@ -94,8 +98,8 @@
         <a:cs typeface="+mn-cs"/>
       </a:defRPr>
     </a:lvl8pPr>
-    <a:lvl9pPr marL="3657600" algn="l" defTabSz="914400" rtl="0" eaLnBrk="1" latinLnBrk="0" hangingPunct="1">
-      <a:defRPr sz="1800" kern="1200">
+    <a:lvl9pPr marL="3655968" algn="l" defTabSz="913992" rtl="0" eaLnBrk="1" latinLnBrk="0" hangingPunct="1">
+      <a:defRPr sz="1799" kern="1200">
         <a:solidFill>
           <a:schemeClr val="tx1"/>
         </a:solidFill>
@@ -111,6 +115,636 @@
     </p:ext>
   </p:extLst>
 </p:presentation>
+</file>
+
+<file path=ppt/notesMasters/notesMaster1.xml><?xml version="1.0" encoding="utf-8"?>
+<p:notesMaster xmlns:a="http://schemas.openxmlformats.org/drawingml/2006/main" xmlns:r="http://schemas.openxmlformats.org/officeDocument/2006/relationships" xmlns:p="http://schemas.openxmlformats.org/presentationml/2006/main">
+  <p:cSld>
+    <p:bg>
+      <p:bgRef idx="1001">
+        <a:schemeClr val="bg1"/>
+      </p:bgRef>
+    </p:bg>
+    <p:spTree>
+      <p:nvGrpSpPr>
+        <p:cNvPr id="1" name=""/>
+        <p:cNvGrpSpPr/>
+        <p:nvPr/>
+      </p:nvGrpSpPr>
+      <p:grpSpPr>
+        <a:xfrm>
+          <a:off x="0" y="0"/>
+          <a:ext cx="0" cy="0"/>
+          <a:chOff x="0" y="0"/>
+          <a:chExt cx="0" cy="0"/>
+        </a:xfrm>
+      </p:grpSpPr>
+      <p:sp>
+        <p:nvSpPr>
+          <p:cNvPr id="2" name="Header Placeholder 1"/>
+          <p:cNvSpPr>
+            <a:spLocks noGrp="1"/>
+          </p:cNvSpPr>
+          <p:nvPr>
+            <p:ph type="hdr" sz="quarter"/>
+          </p:nvPr>
+        </p:nvSpPr>
+        <p:spPr>
+          <a:xfrm>
+            <a:off x="0" y="0"/>
+            <a:ext cx="2971800" cy="458788"/>
+          </a:xfrm>
+          <a:prstGeom prst="rect">
+            <a:avLst/>
+          </a:prstGeom>
+        </p:spPr>
+        <p:txBody>
+          <a:bodyPr vert="horz" lIns="91440" tIns="45720" rIns="91440" bIns="45720" rtlCol="0"/>
+          <a:lstStyle>
+            <a:lvl1pPr algn="l">
+              <a:defRPr sz="1200"/>
+            </a:lvl1pPr>
+          </a:lstStyle>
+          <a:p>
+            <a:endParaRPr lang="en-US"/>
+          </a:p>
+        </p:txBody>
+      </p:sp>
+      <p:sp>
+        <p:nvSpPr>
+          <p:cNvPr id="3" name="Date Placeholder 2"/>
+          <p:cNvSpPr>
+            <a:spLocks noGrp="1"/>
+          </p:cNvSpPr>
+          <p:nvPr>
+            <p:ph type="dt" idx="1"/>
+          </p:nvPr>
+        </p:nvSpPr>
+        <p:spPr>
+          <a:xfrm>
+            <a:off x="3884613" y="0"/>
+            <a:ext cx="2971800" cy="458788"/>
+          </a:xfrm>
+          <a:prstGeom prst="rect">
+            <a:avLst/>
+          </a:prstGeom>
+        </p:spPr>
+        <p:txBody>
+          <a:bodyPr vert="horz" lIns="91440" tIns="45720" rIns="91440" bIns="45720" rtlCol="0"/>
+          <a:lstStyle>
+            <a:lvl1pPr algn="r">
+              <a:defRPr sz="1200"/>
+            </a:lvl1pPr>
+          </a:lstStyle>
+          <a:p>
+            <a:fld id="{686BA7BB-897C-C34D-90D8-FE4E4072A6BA}" type="datetimeFigureOut">
+              <a:rPr lang="en-US" smtClean="0"/>
+              <a:t>10/25/18</a:t>
+            </a:fld>
+            <a:endParaRPr lang="en-US"/>
+          </a:p>
+        </p:txBody>
+      </p:sp>
+      <p:sp>
+        <p:nvSpPr>
+          <p:cNvPr id="4" name="Slide Image Placeholder 3"/>
+          <p:cNvSpPr>
+            <a:spLocks noGrp="1" noRot="1" noChangeAspect="1"/>
+          </p:cNvSpPr>
+          <p:nvPr>
+            <p:ph type="sldImg" idx="2"/>
+          </p:nvPr>
+        </p:nvSpPr>
+        <p:spPr>
+          <a:xfrm>
+            <a:off x="685800" y="1143000"/>
+            <a:ext cx="5486400" cy="3086100"/>
+          </a:xfrm>
+          <a:prstGeom prst="rect">
+            <a:avLst/>
+          </a:prstGeom>
+          <a:noFill/>
+          <a:ln w="12700">
+            <a:solidFill>
+              <a:prstClr val="black"/>
+            </a:solidFill>
+          </a:ln>
+        </p:spPr>
+        <p:txBody>
+          <a:bodyPr vert="horz" lIns="91440" tIns="45720" rIns="91440" bIns="45720" rtlCol="0" anchor="ctr"/>
+          <a:lstStyle/>
+          <a:p>
+            <a:endParaRPr lang="en-US"/>
+          </a:p>
+        </p:txBody>
+      </p:sp>
+      <p:sp>
+        <p:nvSpPr>
+          <p:cNvPr id="5" name="Notes Placeholder 4"/>
+          <p:cNvSpPr>
+            <a:spLocks noGrp="1"/>
+          </p:cNvSpPr>
+          <p:nvPr>
+            <p:ph type="body" sz="quarter" idx="3"/>
+          </p:nvPr>
+        </p:nvSpPr>
+        <p:spPr>
+          <a:xfrm>
+            <a:off x="685800" y="4400550"/>
+            <a:ext cx="5486400" cy="3600450"/>
+          </a:xfrm>
+          <a:prstGeom prst="rect">
+            <a:avLst/>
+          </a:prstGeom>
+        </p:spPr>
+        <p:txBody>
+          <a:bodyPr vert="horz" lIns="91440" tIns="45720" rIns="91440" bIns="45720" rtlCol="0"/>
+          <a:lstStyle/>
+          <a:p>
+            <a:pPr lvl="0"/>
+            <a:r>
+              <a:rPr lang="en-US"/>
+              <a:t>Edit Master text styles</a:t>
+            </a:r>
+          </a:p>
+          <a:p>
+            <a:pPr lvl="1"/>
+            <a:r>
+              <a:rPr lang="en-US"/>
+              <a:t>Second level</a:t>
+            </a:r>
+          </a:p>
+          <a:p>
+            <a:pPr lvl="2"/>
+            <a:r>
+              <a:rPr lang="en-US"/>
+              <a:t>Third level</a:t>
+            </a:r>
+          </a:p>
+          <a:p>
+            <a:pPr lvl="3"/>
+            <a:r>
+              <a:rPr lang="en-US"/>
+              <a:t>Fourth level</a:t>
+            </a:r>
+          </a:p>
+          <a:p>
+            <a:pPr lvl="4"/>
+            <a:r>
+              <a:rPr lang="en-US"/>
+              <a:t>Fifth level</a:t>
+            </a:r>
+          </a:p>
+        </p:txBody>
+      </p:sp>
+      <p:sp>
+        <p:nvSpPr>
+          <p:cNvPr id="6" name="Footer Placeholder 5"/>
+          <p:cNvSpPr>
+            <a:spLocks noGrp="1"/>
+          </p:cNvSpPr>
+          <p:nvPr>
+            <p:ph type="ftr" sz="quarter" idx="4"/>
+          </p:nvPr>
+        </p:nvSpPr>
+        <p:spPr>
+          <a:xfrm>
+            <a:off x="0" y="8685213"/>
+            <a:ext cx="2971800" cy="458787"/>
+          </a:xfrm>
+          <a:prstGeom prst="rect">
+            <a:avLst/>
+          </a:prstGeom>
+        </p:spPr>
+        <p:txBody>
+          <a:bodyPr vert="horz" lIns="91440" tIns="45720" rIns="91440" bIns="45720" rtlCol="0" anchor="b"/>
+          <a:lstStyle>
+            <a:lvl1pPr algn="l">
+              <a:defRPr sz="1200"/>
+            </a:lvl1pPr>
+          </a:lstStyle>
+          <a:p>
+            <a:endParaRPr lang="en-US"/>
+          </a:p>
+        </p:txBody>
+      </p:sp>
+      <p:sp>
+        <p:nvSpPr>
+          <p:cNvPr id="7" name="Slide Number Placeholder 6"/>
+          <p:cNvSpPr>
+            <a:spLocks noGrp="1"/>
+          </p:cNvSpPr>
+          <p:nvPr>
+            <p:ph type="sldNum" sz="quarter" idx="5"/>
+          </p:nvPr>
+        </p:nvSpPr>
+        <p:spPr>
+          <a:xfrm>
+            <a:off x="3884613" y="8685213"/>
+            <a:ext cx="2971800" cy="458787"/>
+          </a:xfrm>
+          <a:prstGeom prst="rect">
+            <a:avLst/>
+          </a:prstGeom>
+        </p:spPr>
+        <p:txBody>
+          <a:bodyPr vert="horz" lIns="91440" tIns="45720" rIns="91440" bIns="45720" rtlCol="0" anchor="b"/>
+          <a:lstStyle>
+            <a:lvl1pPr algn="r">
+              <a:defRPr sz="1200"/>
+            </a:lvl1pPr>
+          </a:lstStyle>
+          <a:p>
+            <a:fld id="{80B05CF7-45C6-BD48-A3AB-5FFEC973BD66}" type="slidenum">
+              <a:rPr lang="en-US" smtClean="0"/>
+              <a:t>‹#›</a:t>
+            </a:fld>
+            <a:endParaRPr lang="en-US"/>
+          </a:p>
+        </p:txBody>
+      </p:sp>
+    </p:spTree>
+    <p:extLst>
+      <p:ext uri="{BB962C8B-B14F-4D97-AF65-F5344CB8AC3E}">
+        <p14:creationId xmlns:p14="http://schemas.microsoft.com/office/powerpoint/2010/main" val="1321444218"/>
+      </p:ext>
+    </p:extLst>
+  </p:cSld>
+  <p:clrMap bg1="lt1" tx1="dk1" bg2="lt2" tx2="dk2" accent1="accent1" accent2="accent2" accent3="accent3" accent4="accent4" accent5="accent5" accent6="accent6" hlink="hlink" folHlink="folHlink"/>
+  <p:notesStyle>
+    <a:lvl1pPr marL="0" algn="l" defTabSz="913992" rtl="0" eaLnBrk="1" latinLnBrk="0" hangingPunct="1">
+      <a:defRPr sz="1202" kern="1200">
+        <a:solidFill>
+          <a:schemeClr val="tx1"/>
+        </a:solidFill>
+        <a:latin typeface="+mn-lt"/>
+        <a:ea typeface="+mn-ea"/>
+        <a:cs typeface="+mn-cs"/>
+      </a:defRPr>
+    </a:lvl1pPr>
+    <a:lvl2pPr marL="456997" algn="l" defTabSz="913992" rtl="0" eaLnBrk="1" latinLnBrk="0" hangingPunct="1">
+      <a:defRPr sz="1202" kern="1200">
+        <a:solidFill>
+          <a:schemeClr val="tx1"/>
+        </a:solidFill>
+        <a:latin typeface="+mn-lt"/>
+        <a:ea typeface="+mn-ea"/>
+        <a:cs typeface="+mn-cs"/>
+      </a:defRPr>
+    </a:lvl2pPr>
+    <a:lvl3pPr marL="913992" algn="l" defTabSz="913992" rtl="0" eaLnBrk="1" latinLnBrk="0" hangingPunct="1">
+      <a:defRPr sz="1202" kern="1200">
+        <a:solidFill>
+          <a:schemeClr val="tx1"/>
+        </a:solidFill>
+        <a:latin typeface="+mn-lt"/>
+        <a:ea typeface="+mn-ea"/>
+        <a:cs typeface="+mn-cs"/>
+      </a:defRPr>
+    </a:lvl3pPr>
+    <a:lvl4pPr marL="1370989" algn="l" defTabSz="913992" rtl="0" eaLnBrk="1" latinLnBrk="0" hangingPunct="1">
+      <a:defRPr sz="1202" kern="1200">
+        <a:solidFill>
+          <a:schemeClr val="tx1"/>
+        </a:solidFill>
+        <a:latin typeface="+mn-lt"/>
+        <a:ea typeface="+mn-ea"/>
+        <a:cs typeface="+mn-cs"/>
+      </a:defRPr>
+    </a:lvl4pPr>
+    <a:lvl5pPr marL="1827984" algn="l" defTabSz="913992" rtl="0" eaLnBrk="1" latinLnBrk="0" hangingPunct="1">
+      <a:defRPr sz="1202" kern="1200">
+        <a:solidFill>
+          <a:schemeClr val="tx1"/>
+        </a:solidFill>
+        <a:latin typeface="+mn-lt"/>
+        <a:ea typeface="+mn-ea"/>
+        <a:cs typeface="+mn-cs"/>
+      </a:defRPr>
+    </a:lvl5pPr>
+    <a:lvl6pPr marL="2284981" algn="l" defTabSz="913992" rtl="0" eaLnBrk="1" latinLnBrk="0" hangingPunct="1">
+      <a:defRPr sz="1202" kern="1200">
+        <a:solidFill>
+          <a:schemeClr val="tx1"/>
+        </a:solidFill>
+        <a:latin typeface="+mn-lt"/>
+        <a:ea typeface="+mn-ea"/>
+        <a:cs typeface="+mn-cs"/>
+      </a:defRPr>
+    </a:lvl6pPr>
+    <a:lvl7pPr marL="2741976" algn="l" defTabSz="913992" rtl="0" eaLnBrk="1" latinLnBrk="0" hangingPunct="1">
+      <a:defRPr sz="1202" kern="1200">
+        <a:solidFill>
+          <a:schemeClr val="tx1"/>
+        </a:solidFill>
+        <a:latin typeface="+mn-lt"/>
+        <a:ea typeface="+mn-ea"/>
+        <a:cs typeface="+mn-cs"/>
+      </a:defRPr>
+    </a:lvl7pPr>
+    <a:lvl8pPr marL="3198973" algn="l" defTabSz="913992" rtl="0" eaLnBrk="1" latinLnBrk="0" hangingPunct="1">
+      <a:defRPr sz="1202" kern="1200">
+        <a:solidFill>
+          <a:schemeClr val="tx1"/>
+        </a:solidFill>
+        <a:latin typeface="+mn-lt"/>
+        <a:ea typeface="+mn-ea"/>
+        <a:cs typeface="+mn-cs"/>
+      </a:defRPr>
+    </a:lvl8pPr>
+    <a:lvl9pPr marL="3655968" algn="l" defTabSz="913992" rtl="0" eaLnBrk="1" latinLnBrk="0" hangingPunct="1">
+      <a:defRPr sz="1202" kern="1200">
+        <a:solidFill>
+          <a:schemeClr val="tx1"/>
+        </a:solidFill>
+        <a:latin typeface="+mn-lt"/>
+        <a:ea typeface="+mn-ea"/>
+        <a:cs typeface="+mn-cs"/>
+      </a:defRPr>
+    </a:lvl9pPr>
+  </p:notesStyle>
+</p:notesMaster>
+</file>
+
+<file path=ppt/notesSlides/notesSlide1.xml><?xml version="1.0" encoding="utf-8"?>
+<p:notes xmlns:a="http://schemas.openxmlformats.org/drawingml/2006/main" xmlns:r="http://schemas.openxmlformats.org/officeDocument/2006/relationships" xmlns:p="http://schemas.openxmlformats.org/presentationml/2006/main">
+  <p:cSld>
+    <p:spTree>
+      <p:nvGrpSpPr>
+        <p:cNvPr id="1" name=""/>
+        <p:cNvGrpSpPr/>
+        <p:nvPr/>
+      </p:nvGrpSpPr>
+      <p:grpSpPr>
+        <a:xfrm>
+          <a:off x="0" y="0"/>
+          <a:ext cx="0" cy="0"/>
+          <a:chOff x="0" y="0"/>
+          <a:chExt cx="0" cy="0"/>
+        </a:xfrm>
+      </p:grpSpPr>
+      <p:sp>
+        <p:nvSpPr>
+          <p:cNvPr id="2" name="Slide Image Placeholder 1"/>
+          <p:cNvSpPr>
+            <a:spLocks noGrp="1" noRot="1" noChangeAspect="1"/>
+          </p:cNvSpPr>
+          <p:nvPr>
+            <p:ph type="sldImg"/>
+          </p:nvPr>
+        </p:nvSpPr>
+        <p:spPr/>
+      </p:sp>
+      <p:sp>
+        <p:nvSpPr>
+          <p:cNvPr id="3" name="Notes Placeholder 2"/>
+          <p:cNvSpPr>
+            <a:spLocks noGrp="1"/>
+          </p:cNvSpPr>
+          <p:nvPr>
+            <p:ph type="body" idx="1"/>
+          </p:nvPr>
+        </p:nvSpPr>
+        <p:spPr/>
+        <p:txBody>
+          <a:bodyPr/>
+          <a:lstStyle/>
+          <a:p>
+            <a:r>
+              <a:rPr lang="en-US" dirty="0"/>
+              <a:t>TPC-H</a:t>
+            </a:r>
+          </a:p>
+        </p:txBody>
+      </p:sp>
+      <p:sp>
+        <p:nvSpPr>
+          <p:cNvPr id="4" name="Slide Number Placeholder 3"/>
+          <p:cNvSpPr>
+            <a:spLocks noGrp="1"/>
+          </p:cNvSpPr>
+          <p:nvPr>
+            <p:ph type="sldNum" sz="quarter" idx="5"/>
+          </p:nvPr>
+        </p:nvSpPr>
+        <p:spPr/>
+        <p:txBody>
+          <a:bodyPr/>
+          <a:lstStyle/>
+          <a:p>
+            <a:fld id="{80B05CF7-45C6-BD48-A3AB-5FFEC973BD66}" type="slidenum">
+              <a:rPr lang="en-US" smtClean="0"/>
+              <a:t>1</a:t>
+            </a:fld>
+            <a:endParaRPr lang="en-US"/>
+          </a:p>
+        </p:txBody>
+      </p:sp>
+    </p:spTree>
+    <p:extLst>
+      <p:ext uri="{BB962C8B-B14F-4D97-AF65-F5344CB8AC3E}">
+        <p14:creationId xmlns:p14="http://schemas.microsoft.com/office/powerpoint/2010/main" val="1759273983"/>
+      </p:ext>
+    </p:extLst>
+  </p:cSld>
+  <p:clrMapOvr>
+    <a:masterClrMapping/>
+  </p:clrMapOvr>
+</p:notes>
+</file>
+
+<file path=ppt/notesSlides/notesSlide2.xml><?xml version="1.0" encoding="utf-8"?>
+<p:notes xmlns:a="http://schemas.openxmlformats.org/drawingml/2006/main" xmlns:r="http://schemas.openxmlformats.org/officeDocument/2006/relationships" xmlns:p="http://schemas.openxmlformats.org/presentationml/2006/main">
+  <p:cSld>
+    <p:spTree>
+      <p:nvGrpSpPr>
+        <p:cNvPr id="1" name=""/>
+        <p:cNvGrpSpPr/>
+        <p:nvPr/>
+      </p:nvGrpSpPr>
+      <p:grpSpPr>
+        <a:xfrm>
+          <a:off x="0" y="0"/>
+          <a:ext cx="0" cy="0"/>
+          <a:chOff x="0" y="0"/>
+          <a:chExt cx="0" cy="0"/>
+        </a:xfrm>
+      </p:grpSpPr>
+      <p:sp>
+        <p:nvSpPr>
+          <p:cNvPr id="2" name="Slide Image Placeholder 1"/>
+          <p:cNvSpPr>
+            <a:spLocks noGrp="1" noRot="1" noChangeAspect="1"/>
+          </p:cNvSpPr>
+          <p:nvPr>
+            <p:ph type="sldImg"/>
+          </p:nvPr>
+        </p:nvSpPr>
+        <p:spPr/>
+      </p:sp>
+      <p:sp>
+        <p:nvSpPr>
+          <p:cNvPr id="3" name="Notes Placeholder 2"/>
+          <p:cNvSpPr>
+            <a:spLocks noGrp="1"/>
+          </p:cNvSpPr>
+          <p:nvPr>
+            <p:ph type="body" idx="1"/>
+          </p:nvPr>
+        </p:nvSpPr>
+        <p:spPr/>
+        <p:txBody>
+          <a:bodyPr/>
+          <a:lstStyle/>
+          <a:p>
+            <a:r>
+              <a:rPr lang="en-US" dirty="0"/>
+              <a:t>Air Traffic</a:t>
+            </a:r>
+          </a:p>
+        </p:txBody>
+      </p:sp>
+      <p:sp>
+        <p:nvSpPr>
+          <p:cNvPr id="4" name="Slide Number Placeholder 3"/>
+          <p:cNvSpPr>
+            <a:spLocks noGrp="1"/>
+          </p:cNvSpPr>
+          <p:nvPr>
+            <p:ph type="sldNum" sz="quarter" idx="5"/>
+          </p:nvPr>
+        </p:nvSpPr>
+        <p:spPr/>
+        <p:txBody>
+          <a:bodyPr/>
+          <a:lstStyle/>
+          <a:p>
+            <a:fld id="{80B05CF7-45C6-BD48-A3AB-5FFEC973BD66}" type="slidenum">
+              <a:rPr lang="en-US" smtClean="0"/>
+              <a:t>2</a:t>
+            </a:fld>
+            <a:endParaRPr lang="en-US"/>
+          </a:p>
+        </p:txBody>
+      </p:sp>
+    </p:spTree>
+    <p:extLst>
+      <p:ext uri="{BB962C8B-B14F-4D97-AF65-F5344CB8AC3E}">
+        <p14:creationId xmlns:p14="http://schemas.microsoft.com/office/powerpoint/2010/main" val="67861569"/>
+      </p:ext>
+    </p:extLst>
+  </p:cSld>
+  <p:clrMapOvr>
+    <a:masterClrMapping/>
+  </p:clrMapOvr>
+</p:notes>
+</file>
+
+<file path=ppt/notesSlides/notesSlide3.xml><?xml version="1.0" encoding="utf-8"?>
+<p:notes xmlns:a="http://schemas.openxmlformats.org/drawingml/2006/main" xmlns:r="http://schemas.openxmlformats.org/officeDocument/2006/relationships" xmlns:p="http://schemas.openxmlformats.org/presentationml/2006/main">
+  <p:cSld>
+    <p:spTree>
+      <p:nvGrpSpPr>
+        <p:cNvPr id="1" name=""/>
+        <p:cNvGrpSpPr/>
+        <p:nvPr/>
+      </p:nvGrpSpPr>
+      <p:grpSpPr>
+        <a:xfrm>
+          <a:off x="0" y="0"/>
+          <a:ext cx="0" cy="0"/>
+          <a:chOff x="0" y="0"/>
+          <a:chExt cx="0" cy="0"/>
+        </a:xfrm>
+      </p:grpSpPr>
+      <p:sp>
+        <p:nvSpPr>
+          <p:cNvPr id="2" name="Slide Image Placeholder 1"/>
+          <p:cNvSpPr>
+            <a:spLocks noGrp="1" noRot="1" noChangeAspect="1"/>
+          </p:cNvSpPr>
+          <p:nvPr>
+            <p:ph type="sldImg"/>
+          </p:nvPr>
+        </p:nvSpPr>
+        <p:spPr/>
+      </p:sp>
+      <p:sp>
+        <p:nvSpPr>
+          <p:cNvPr id="3" name="Notes Placeholder 2"/>
+          <p:cNvSpPr>
+            <a:spLocks noGrp="1"/>
+          </p:cNvSpPr>
+          <p:nvPr>
+            <p:ph type="body" idx="1"/>
+          </p:nvPr>
+        </p:nvSpPr>
+        <p:spPr/>
+        <p:txBody>
+          <a:bodyPr/>
+          <a:lstStyle/>
+          <a:p>
+            <a:pPr marL="0" marR="0" lvl="0" indent="0" algn="l" defTabSz="913992" rtl="0" eaLnBrk="1" fontAlgn="auto" latinLnBrk="0" hangingPunct="1">
+              <a:lnSpc>
+                <a:spcPct val="100000"/>
+              </a:lnSpc>
+              <a:spcBef>
+                <a:spcPts val="0"/>
+              </a:spcBef>
+              <a:spcAft>
+                <a:spcPts val="0"/>
+              </a:spcAft>
+              <a:buClrTx/>
+              <a:buSzTx/>
+              <a:buFontTx/>
+              <a:buNone/>
+              <a:tabLst/>
+              <a:defRPr/>
+            </a:pPr>
+            <a:r>
+              <a:rPr lang="en-US" dirty="0"/>
+              <a:t>Air Traffic</a:t>
+            </a:r>
+          </a:p>
+          <a:p>
+            <a:endParaRPr lang="en-US" dirty="0"/>
+          </a:p>
+        </p:txBody>
+      </p:sp>
+      <p:sp>
+        <p:nvSpPr>
+          <p:cNvPr id="4" name="Slide Number Placeholder 3"/>
+          <p:cNvSpPr>
+            <a:spLocks noGrp="1"/>
+          </p:cNvSpPr>
+          <p:nvPr>
+            <p:ph type="sldNum" sz="quarter" idx="5"/>
+          </p:nvPr>
+        </p:nvSpPr>
+        <p:spPr/>
+        <p:txBody>
+          <a:bodyPr/>
+          <a:lstStyle/>
+          <a:p>
+            <a:fld id="{80B05CF7-45C6-BD48-A3AB-5FFEC973BD66}" type="slidenum">
+              <a:rPr lang="en-US" smtClean="0"/>
+              <a:t>3</a:t>
+            </a:fld>
+            <a:endParaRPr lang="en-US"/>
+          </a:p>
+        </p:txBody>
+      </p:sp>
+    </p:spTree>
+    <p:extLst>
+      <p:ext uri="{BB962C8B-B14F-4D97-AF65-F5344CB8AC3E}">
+        <p14:creationId xmlns:p14="http://schemas.microsoft.com/office/powerpoint/2010/main" val="1601225890"/>
+      </p:ext>
+    </p:extLst>
+  </p:cSld>
+  <p:clrMapOvr>
+    <a:masterClrMapping/>
+  </p:clrMapOvr>
+</p:notes>
 </file>
 
 <file path=ppt/slideLayouts/slideLayout1.xml><?xml version="1.0" encoding="utf-8"?>
@@ -142,8 +776,8 @@
         </p:nvSpPr>
         <p:spPr>
           <a:xfrm>
-            <a:off x="1524000" y="1122363"/>
-            <a:ext cx="9144000" cy="2387600"/>
+            <a:off x="1524005" y="1122365"/>
+            <a:ext cx="9144002" cy="2387600"/>
           </a:xfrm>
         </p:spPr>
         <p:txBody>
@@ -173,8 +807,8 @@
         </p:nvSpPr>
         <p:spPr>
           <a:xfrm>
-            <a:off x="1524000" y="3602038"/>
-            <a:ext cx="9144000" cy="1655762"/>
+            <a:off x="1524005" y="3602040"/>
+            <a:ext cx="9144002" cy="1655763"/>
           </a:xfrm>
         </p:spPr>
         <p:txBody>
@@ -242,7 +876,7 @@
           <a:p>
             <a:fld id="{A5AF2242-1967-7D4E-9D4D-F8DEECE8E6E1}" type="datetimeFigureOut">
               <a:rPr lang="en-US" smtClean="0"/>
-              <a:t>10/4/18</a:t>
+              <a:t>10/25/18</a:t>
             </a:fld>
             <a:endParaRPr lang="en-US"/>
           </a:p>
@@ -410,7 +1044,7 @@
           <a:p>
             <a:fld id="{A5AF2242-1967-7D4E-9D4D-F8DEECE8E6E1}" type="datetimeFigureOut">
               <a:rPr lang="en-US" smtClean="0"/>
-              <a:t>10/4/18</a:t>
+              <a:t>10/25/18</a:t>
             </a:fld>
             <a:endParaRPr lang="en-US"/>
           </a:p>
@@ -500,8 +1134,8 @@
         </p:nvSpPr>
         <p:spPr>
           <a:xfrm>
-            <a:off x="8724900" y="365125"/>
-            <a:ext cx="2628900" cy="5811838"/>
+            <a:off x="8724904" y="365126"/>
+            <a:ext cx="2628899" cy="5811837"/>
           </a:xfrm>
         </p:spPr>
         <p:txBody>
@@ -527,8 +1161,8 @@
         </p:nvSpPr>
         <p:spPr>
           <a:xfrm>
-            <a:off x="838200" y="365125"/>
-            <a:ext cx="7734300" cy="5811838"/>
+            <a:off x="838201" y="365126"/>
+            <a:ext cx="7734302" cy="5811837"/>
           </a:xfrm>
         </p:spPr>
         <p:txBody>
@@ -588,7 +1222,7 @@
           <a:p>
             <a:fld id="{A5AF2242-1967-7D4E-9D4D-F8DEECE8E6E1}" type="datetimeFigureOut">
               <a:rPr lang="en-US" smtClean="0"/>
-              <a:t>10/4/18</a:t>
+              <a:t>10/25/18</a:t>
             </a:fld>
             <a:endParaRPr lang="en-US"/>
           </a:p>
@@ -756,7 +1390,7 @@
           <a:p>
             <a:fld id="{A5AF2242-1967-7D4E-9D4D-F8DEECE8E6E1}" type="datetimeFigureOut">
               <a:rPr lang="en-US" smtClean="0"/>
-              <a:t>10/4/18</a:t>
+              <a:t>10/25/18</a:t>
             </a:fld>
             <a:endParaRPr lang="en-US"/>
           </a:p>
@@ -846,7 +1480,7 @@
         </p:nvSpPr>
         <p:spPr>
           <a:xfrm>
-            <a:off x="831850" y="1709738"/>
+            <a:off x="831849" y="1709740"/>
             <a:ext cx="10515600" cy="2852737"/>
           </a:xfrm>
         </p:spPr>
@@ -877,7 +1511,7 @@
         </p:nvSpPr>
         <p:spPr>
           <a:xfrm>
-            <a:off x="831850" y="4589463"/>
+            <a:off x="831849" y="4589467"/>
             <a:ext cx="10515600" cy="1500187"/>
           </a:xfrm>
         </p:spPr>
@@ -1001,7 +1635,7 @@
           <a:p>
             <a:fld id="{A5AF2242-1967-7D4E-9D4D-F8DEECE8E6E1}" type="datetimeFigureOut">
               <a:rPr lang="en-US" smtClean="0"/>
-              <a:t>10/4/18</a:t>
+              <a:t>10/25/18</a:t>
             </a:fld>
             <a:endParaRPr lang="en-US"/>
           </a:p>
@@ -1113,7 +1747,7 @@
         </p:nvSpPr>
         <p:spPr>
           <a:xfrm>
-            <a:off x="838200" y="1825625"/>
+            <a:off x="838203" y="1825626"/>
             <a:ext cx="5181600" cy="4351338"/>
           </a:xfrm>
         </p:spPr>
@@ -1169,7 +1803,7 @@
         </p:nvSpPr>
         <p:spPr>
           <a:xfrm>
-            <a:off x="6172200" y="1825625"/>
+            <a:off x="6172202" y="1825626"/>
             <a:ext cx="5181600" cy="4351338"/>
           </a:xfrm>
         </p:spPr>
@@ -1230,7 +1864,7 @@
           <a:p>
             <a:fld id="{A5AF2242-1967-7D4E-9D4D-F8DEECE8E6E1}" type="datetimeFigureOut">
               <a:rPr lang="en-US" smtClean="0"/>
-              <a:t>10/4/18</a:t>
+              <a:t>10/25/18</a:t>
             </a:fld>
             <a:endParaRPr lang="en-US"/>
           </a:p>
@@ -1320,8 +1954,8 @@
         </p:nvSpPr>
         <p:spPr>
           <a:xfrm>
-            <a:off x="839788" y="365125"/>
-            <a:ext cx="10515600" cy="1325563"/>
+            <a:off x="839788" y="365129"/>
+            <a:ext cx="10515600" cy="1325562"/>
           </a:xfrm>
         </p:spPr>
         <p:txBody>
@@ -1347,8 +1981,8 @@
         </p:nvSpPr>
         <p:spPr>
           <a:xfrm>
-            <a:off x="839788" y="1681163"/>
-            <a:ext cx="5157787" cy="823912"/>
+            <a:off x="839788" y="1681164"/>
+            <a:ext cx="5157786" cy="823913"/>
           </a:xfrm>
         </p:spPr>
         <p:txBody>
@@ -1412,8 +2046,8 @@
         </p:nvSpPr>
         <p:spPr>
           <a:xfrm>
-            <a:off x="839788" y="2505075"/>
-            <a:ext cx="5157787" cy="3684588"/>
+            <a:off x="839788" y="2505076"/>
+            <a:ext cx="5157786" cy="3684588"/>
           </a:xfrm>
         </p:spPr>
         <p:txBody>
@@ -1468,8 +2102,8 @@
         </p:nvSpPr>
         <p:spPr>
           <a:xfrm>
-            <a:off x="6172200" y="1681163"/>
-            <a:ext cx="5183188" cy="823912"/>
+            <a:off x="6172199" y="1681164"/>
+            <a:ext cx="5183190" cy="823913"/>
           </a:xfrm>
         </p:spPr>
         <p:txBody>
@@ -1533,8 +2167,8 @@
         </p:nvSpPr>
         <p:spPr>
           <a:xfrm>
-            <a:off x="6172200" y="2505075"/>
-            <a:ext cx="5183188" cy="3684588"/>
+            <a:off x="6172199" y="2505076"/>
+            <a:ext cx="5183190" cy="3684588"/>
           </a:xfrm>
         </p:spPr>
         <p:txBody>
@@ -1594,7 +2228,7 @@
           <a:p>
             <a:fld id="{A5AF2242-1967-7D4E-9D4D-F8DEECE8E6E1}" type="datetimeFigureOut">
               <a:rPr lang="en-US" smtClean="0"/>
-              <a:t>10/4/18</a:t>
+              <a:t>10/25/18</a:t>
             </a:fld>
             <a:endParaRPr lang="en-US"/>
           </a:p>
@@ -1711,7 +2345,7 @@
           <a:p>
             <a:fld id="{A5AF2242-1967-7D4E-9D4D-F8DEECE8E6E1}" type="datetimeFigureOut">
               <a:rPr lang="en-US" smtClean="0"/>
-              <a:t>10/4/18</a:t>
+              <a:t>10/25/18</a:t>
             </a:fld>
             <a:endParaRPr lang="en-US"/>
           </a:p>
@@ -1806,7 +2440,7 @@
           <a:p>
             <a:fld id="{A5AF2242-1967-7D4E-9D4D-F8DEECE8E6E1}" type="datetimeFigureOut">
               <a:rPr lang="en-US" smtClean="0"/>
-              <a:t>10/4/18</a:t>
+              <a:t>10/25/18</a:t>
             </a:fld>
             <a:endParaRPr lang="en-US"/>
           </a:p>
@@ -1896,8 +2530,8 @@
         </p:nvSpPr>
         <p:spPr>
           <a:xfrm>
-            <a:off x="839788" y="457200"/>
-            <a:ext cx="3932237" cy="1600200"/>
+            <a:off x="839788" y="457201"/>
+            <a:ext cx="3932237" cy="1600202"/>
           </a:xfrm>
         </p:spPr>
         <p:txBody>
@@ -1927,8 +2561,8 @@
         </p:nvSpPr>
         <p:spPr>
           <a:xfrm>
-            <a:off x="5183188" y="987425"/>
-            <a:ext cx="6172200" cy="4873625"/>
+            <a:off x="5183191" y="987426"/>
+            <a:ext cx="6172198" cy="4873624"/>
           </a:xfrm>
         </p:spPr>
         <p:txBody>
@@ -2011,8 +2645,8 @@
         </p:nvSpPr>
         <p:spPr>
           <a:xfrm>
-            <a:off x="839788" y="2057400"/>
-            <a:ext cx="3932237" cy="3811588"/>
+            <a:off x="839788" y="2057401"/>
+            <a:ext cx="3932237" cy="3811589"/>
           </a:xfrm>
         </p:spPr>
         <p:txBody>
@@ -2081,7 +2715,7 @@
           <a:p>
             <a:fld id="{A5AF2242-1967-7D4E-9D4D-F8DEECE8E6E1}" type="datetimeFigureOut">
               <a:rPr lang="en-US" smtClean="0"/>
-              <a:t>10/4/18</a:t>
+              <a:t>10/25/18</a:t>
             </a:fld>
             <a:endParaRPr lang="en-US"/>
           </a:p>
@@ -2171,8 +2805,8 @@
         </p:nvSpPr>
         <p:spPr>
           <a:xfrm>
-            <a:off x="839788" y="457200"/>
-            <a:ext cx="3932237" cy="1600200"/>
+            <a:off x="839788" y="457201"/>
+            <a:ext cx="3932237" cy="1600202"/>
           </a:xfrm>
         </p:spPr>
         <p:txBody>
@@ -2202,8 +2836,8 @@
         </p:nvSpPr>
         <p:spPr>
           <a:xfrm>
-            <a:off x="5183188" y="987425"/>
-            <a:ext cx="6172200" cy="4873625"/>
+            <a:off x="5183191" y="987426"/>
+            <a:ext cx="6172198" cy="4873624"/>
           </a:xfrm>
         </p:spPr>
         <p:txBody>
@@ -2263,8 +2897,8 @@
         </p:nvSpPr>
         <p:spPr>
           <a:xfrm>
-            <a:off x="839788" y="2057400"/>
-            <a:ext cx="3932237" cy="3811588"/>
+            <a:off x="839788" y="2057401"/>
+            <a:ext cx="3932237" cy="3811589"/>
           </a:xfrm>
         </p:spPr>
         <p:txBody>
@@ -2333,7 +2967,7 @@
           <a:p>
             <a:fld id="{A5AF2242-1967-7D4E-9D4D-F8DEECE8E6E1}" type="datetimeFigureOut">
               <a:rPr lang="en-US" smtClean="0"/>
-              <a:t>10/4/18</a:t>
+              <a:t>10/25/18</a:t>
             </a:fld>
             <a:endParaRPr lang="en-US"/>
           </a:p>
@@ -2428,8 +3062,8 @@
         </p:nvSpPr>
         <p:spPr>
           <a:xfrm>
-            <a:off x="838200" y="365125"/>
-            <a:ext cx="10515600" cy="1325563"/>
+            <a:off x="838201" y="365129"/>
+            <a:ext cx="10515600" cy="1325562"/>
           </a:xfrm>
           <a:prstGeom prst="rect">
             <a:avLst/>
@@ -2460,7 +3094,7 @@
         </p:nvSpPr>
         <p:spPr>
           <a:xfrm>
-            <a:off x="838200" y="1825625"/>
+            <a:off x="838201" y="1825626"/>
             <a:ext cx="10515600" cy="4351338"/>
           </a:xfrm>
           <a:prstGeom prst="rect">
@@ -2521,8 +3155,8 @@
         </p:nvSpPr>
         <p:spPr>
           <a:xfrm>
-            <a:off x="838200" y="6356350"/>
-            <a:ext cx="2743200" cy="365125"/>
+            <a:off x="838202" y="6356353"/>
+            <a:ext cx="2743198" cy="365125"/>
           </a:xfrm>
           <a:prstGeom prst="rect">
             <a:avLst/>
@@ -2544,7 +3178,7 @@
           <a:p>
             <a:fld id="{A5AF2242-1967-7D4E-9D4D-F8DEECE8E6E1}" type="datetimeFigureOut">
               <a:rPr lang="en-US" smtClean="0"/>
-              <a:t>10/4/18</a:t>
+              <a:t>10/25/18</a:t>
             </a:fld>
             <a:endParaRPr lang="en-US"/>
           </a:p>
@@ -2562,7 +3196,7 @@
         </p:nvSpPr>
         <p:spPr>
           <a:xfrm>
-            <a:off x="4038600" y="6356350"/>
+            <a:off x="4038601" y="6356353"/>
             <a:ext cx="4114800" cy="365125"/>
           </a:xfrm>
           <a:prstGeom prst="rect">
@@ -2599,8 +3233,8 @@
         </p:nvSpPr>
         <p:spPr>
           <a:xfrm>
-            <a:off x="8610600" y="6356350"/>
-            <a:ext cx="2743200" cy="365125"/>
+            <a:off x="8610602" y="6356353"/>
+            <a:ext cx="2743198" cy="365125"/>
           </a:xfrm>
           <a:prstGeom prst="rect">
             <a:avLst/>
@@ -2933,7 +3567,417 @@
 </file>
 
 <file path=ppt/slides/slide1.xml><?xml version="1.0" encoding="utf-8"?>
-<p:sld xmlns:a="http://schemas.openxmlformats.org/drawingml/2006/main" xmlns:r="http://schemas.openxmlformats.org/officeDocument/2006/relationships" xmlns:p="http://schemas.openxmlformats.org/presentationml/2006/main" show="0">
+<p:sld xmlns:a="http://schemas.openxmlformats.org/drawingml/2006/main" xmlns:r="http://schemas.openxmlformats.org/officeDocument/2006/relationships" xmlns:p="http://schemas.openxmlformats.org/presentationml/2006/main">
+  <p:cSld>
+    <p:spTree>
+      <p:nvGrpSpPr>
+        <p:cNvPr id="1" name=""/>
+        <p:cNvGrpSpPr/>
+        <p:nvPr/>
+      </p:nvGrpSpPr>
+      <p:grpSpPr>
+        <a:xfrm>
+          <a:off x="0" y="0"/>
+          <a:ext cx="0" cy="0"/>
+          <a:chOff x="0" y="0"/>
+          <a:chExt cx="0" cy="0"/>
+        </a:xfrm>
+      </p:grpSpPr>
+      <p:cxnSp>
+        <p:nvCxnSpPr>
+          <p:cNvPr id="6" name="Straight Arrow Connector 5">
+            <a:extLst>
+              <a:ext uri="{FF2B5EF4-FFF2-40B4-BE49-F238E27FC236}">
+                <a16:creationId xmlns:a16="http://schemas.microsoft.com/office/drawing/2014/main" id="{963F7C66-00F8-B447-9813-3C3C0D4E2CA9}"/>
+              </a:ext>
+            </a:extLst>
+          </p:cNvPr>
+          <p:cNvCxnSpPr>
+            <a:cxnSpLocks/>
+          </p:cNvCxnSpPr>
+          <p:nvPr/>
+        </p:nvCxnSpPr>
+        <p:spPr>
+          <a:xfrm>
+            <a:off x="353253" y="60972"/>
+            <a:ext cx="0" cy="5013948"/>
+          </a:xfrm>
+          <a:prstGeom prst="straightConnector1">
+            <a:avLst/>
+          </a:prstGeom>
+          <a:ln w="38100">
+            <a:solidFill>
+              <a:schemeClr val="tx1"/>
+            </a:solidFill>
+            <a:headEnd type="triangle"/>
+            <a:tailEnd type="none"/>
+          </a:ln>
+        </p:spPr>
+        <p:style>
+          <a:lnRef idx="1">
+            <a:schemeClr val="accent1"/>
+          </a:lnRef>
+          <a:fillRef idx="0">
+            <a:schemeClr val="accent1"/>
+          </a:fillRef>
+          <a:effectRef idx="0">
+            <a:schemeClr val="accent1"/>
+          </a:effectRef>
+          <a:fontRef idx="minor">
+            <a:schemeClr val="tx1"/>
+          </a:fontRef>
+        </p:style>
+      </p:cxnSp>
+      <p:sp>
+        <p:nvSpPr>
+          <p:cNvPr id="7" name="Title 1">
+            <a:extLst>
+              <a:ext uri="{FF2B5EF4-FFF2-40B4-BE49-F238E27FC236}">
+                <a16:creationId xmlns:a16="http://schemas.microsoft.com/office/drawing/2014/main" id="{EE22E412-21EF-244E-BD5C-464E66827A7E}"/>
+              </a:ext>
+            </a:extLst>
+          </p:cNvPr>
+          <p:cNvSpPr txBox="1">
+            <a:spLocks noChangeAspect="1"/>
+          </p:cNvSpPr>
+          <p:nvPr/>
+        </p:nvSpPr>
+        <p:spPr>
+          <a:xfrm rot="16200000">
+            <a:off x="-2250484" y="2428615"/>
+            <a:ext cx="4896791" cy="395822"/>
+          </a:xfrm>
+          <a:prstGeom prst="rect">
+            <a:avLst/>
+          </a:prstGeom>
+        </p:spPr>
+        <p:txBody>
+          <a:bodyPr vert="horz" lIns="91440" tIns="45720" rIns="91440" bIns="45720" rtlCol="0" anchor="ctr" anchorCtr="1">
+            <a:noAutofit/>
+          </a:bodyPr>
+          <a:lstStyle>
+            <a:lvl1pPr algn="l" defTabSz="914400" rtl="0" eaLnBrk="1" latinLnBrk="0" hangingPunct="1">
+              <a:lnSpc>
+                <a:spcPct val="90000"/>
+              </a:lnSpc>
+              <a:spcBef>
+                <a:spcPct val="0"/>
+              </a:spcBef>
+              <a:buNone/>
+              <a:defRPr sz="3800" kern="1200">
+                <a:solidFill>
+                  <a:srgbClr val="3E606F"/>
+                </a:solidFill>
+                <a:latin typeface="PF Handbook Pro" panose="02000506090000020004" pitchFamily="50" charset="0"/>
+                <a:ea typeface="+mj-ea"/>
+                <a:cs typeface="+mj-cs"/>
+              </a:defRPr>
+            </a:lvl1pPr>
+          </a:lstStyle>
+          <a:p>
+            <a:r>
+              <a:rPr lang="en-US" sz="1600" dirty="0">
+                <a:solidFill>
+                  <a:schemeClr val="tx1"/>
+                </a:solidFill>
+              </a:rPr>
+              <a:t>deviation = (estimated – actual)/actual*100</a:t>
+            </a:r>
+          </a:p>
+        </p:txBody>
+      </p:sp>
+      <p:cxnSp>
+        <p:nvCxnSpPr>
+          <p:cNvPr id="8" name="Straight Arrow Connector 7">
+            <a:extLst>
+              <a:ext uri="{FF2B5EF4-FFF2-40B4-BE49-F238E27FC236}">
+                <a16:creationId xmlns:a16="http://schemas.microsoft.com/office/drawing/2014/main" id="{CB0EBA04-465D-B145-8438-555D84BA7BB9}"/>
+              </a:ext>
+            </a:extLst>
+          </p:cNvPr>
+          <p:cNvCxnSpPr>
+            <a:cxnSpLocks/>
+          </p:cNvCxnSpPr>
+          <p:nvPr/>
+        </p:nvCxnSpPr>
+        <p:spPr>
+          <a:xfrm flipH="1">
+            <a:off x="1068779" y="5277718"/>
+            <a:ext cx="4317552" cy="0"/>
+          </a:xfrm>
+          <a:prstGeom prst="straightConnector1">
+            <a:avLst/>
+          </a:prstGeom>
+          <a:ln w="38100">
+            <a:solidFill>
+              <a:schemeClr val="tx1"/>
+            </a:solidFill>
+            <a:headEnd type="triangle"/>
+            <a:tailEnd type="none"/>
+          </a:ln>
+        </p:spPr>
+        <p:style>
+          <a:lnRef idx="1">
+            <a:schemeClr val="accent1"/>
+          </a:lnRef>
+          <a:fillRef idx="0">
+            <a:schemeClr val="accent1"/>
+          </a:fillRef>
+          <a:effectRef idx="0">
+            <a:schemeClr val="accent1"/>
+          </a:effectRef>
+          <a:fontRef idx="minor">
+            <a:schemeClr val="tx1"/>
+          </a:fontRef>
+        </p:style>
+      </p:cxnSp>
+      <p:sp>
+        <p:nvSpPr>
+          <p:cNvPr id="9" name="Title 1">
+            <a:extLst>
+              <a:ext uri="{FF2B5EF4-FFF2-40B4-BE49-F238E27FC236}">
+                <a16:creationId xmlns:a16="http://schemas.microsoft.com/office/drawing/2014/main" id="{7A816468-73CB-0A47-9BC5-D0ED7B683B81}"/>
+              </a:ext>
+            </a:extLst>
+          </p:cNvPr>
+          <p:cNvSpPr txBox="1">
+            <a:spLocks noChangeAspect="1"/>
+          </p:cNvSpPr>
+          <p:nvPr/>
+        </p:nvSpPr>
+        <p:spPr>
+          <a:xfrm>
+            <a:off x="1068779" y="5238952"/>
+            <a:ext cx="4215740" cy="395822"/>
+          </a:xfrm>
+          <a:prstGeom prst="rect">
+            <a:avLst/>
+          </a:prstGeom>
+        </p:spPr>
+        <p:txBody>
+          <a:bodyPr vert="horz" lIns="91440" tIns="45720" rIns="91440" bIns="45720" rtlCol="0" anchor="ctr" anchorCtr="1">
+            <a:noAutofit/>
+          </a:bodyPr>
+          <a:lstStyle>
+            <a:lvl1pPr algn="l" defTabSz="914400" rtl="0" eaLnBrk="1" latinLnBrk="0" hangingPunct="1">
+              <a:lnSpc>
+                <a:spcPct val="90000"/>
+              </a:lnSpc>
+              <a:spcBef>
+                <a:spcPct val="0"/>
+              </a:spcBef>
+              <a:buNone/>
+              <a:defRPr sz="3800" kern="1200">
+                <a:solidFill>
+                  <a:srgbClr val="3E606F"/>
+                </a:solidFill>
+                <a:latin typeface="PF Handbook Pro" panose="02000506090000020004" pitchFamily="50" charset="0"/>
+                <a:ea typeface="+mj-ea"/>
+                <a:cs typeface="+mj-cs"/>
+              </a:defRPr>
+            </a:lvl1pPr>
+          </a:lstStyle>
+          <a:p>
+            <a:r>
+              <a:rPr lang="en-US" sz="1600" dirty="0">
+                <a:solidFill>
+                  <a:schemeClr val="tx1"/>
+                </a:solidFill>
+              </a:rPr>
+              <a:t>No. of training queries</a:t>
+            </a:r>
+          </a:p>
+        </p:txBody>
+      </p:sp>
+      <p:pic>
+        <p:nvPicPr>
+          <p:cNvPr id="3" name="Picture 2">
+            <a:extLst>
+              <a:ext uri="{FF2B5EF4-FFF2-40B4-BE49-F238E27FC236}">
+                <a16:creationId xmlns:a16="http://schemas.microsoft.com/office/drawing/2014/main" id="{D6FA11D7-AA44-F04B-9082-D32A20082F8B}"/>
+              </a:ext>
+            </a:extLst>
+          </p:cNvPr>
+          <p:cNvPicPr>
+            <a:picLocks/>
+          </p:cNvPicPr>
+          <p:nvPr/>
+        </p:nvPicPr>
+        <p:blipFill rotWithShape="1">
+          <a:blip r:embed="rId3"/>
+          <a:srcRect l="5419" t="11497" r="9722" b="6580"/>
+          <a:stretch/>
+        </p:blipFill>
+        <p:spPr>
+          <a:xfrm>
+            <a:off x="424800" y="32400"/>
+            <a:ext cx="4968000" cy="2520000"/>
+          </a:xfrm>
+          <a:prstGeom prst="rect">
+            <a:avLst/>
+          </a:prstGeom>
+        </p:spPr>
+      </p:pic>
+      <p:pic>
+        <p:nvPicPr>
+          <p:cNvPr id="5" name="Picture 4">
+            <a:extLst>
+              <a:ext uri="{FF2B5EF4-FFF2-40B4-BE49-F238E27FC236}">
+                <a16:creationId xmlns:a16="http://schemas.microsoft.com/office/drawing/2014/main" id="{9F4118DC-F71D-7243-B9A1-1E8714838F90}"/>
+              </a:ext>
+            </a:extLst>
+          </p:cNvPr>
+          <p:cNvPicPr>
+            <a:picLocks/>
+          </p:cNvPicPr>
+          <p:nvPr/>
+        </p:nvPicPr>
+        <p:blipFill rotWithShape="1">
+          <a:blip r:embed="rId4"/>
+          <a:srcRect l="-1" t="11467" r="9614" b="6607"/>
+          <a:stretch/>
+        </p:blipFill>
+        <p:spPr>
+          <a:xfrm>
+            <a:off x="424050" y="2671200"/>
+            <a:ext cx="4968000" cy="2520000"/>
+          </a:xfrm>
+          <a:prstGeom prst="rect">
+            <a:avLst/>
+          </a:prstGeom>
+        </p:spPr>
+      </p:pic>
+      <p:sp>
+        <p:nvSpPr>
+          <p:cNvPr id="15" name="Title 1">
+            <a:extLst>
+              <a:ext uri="{FF2B5EF4-FFF2-40B4-BE49-F238E27FC236}">
+                <a16:creationId xmlns:a16="http://schemas.microsoft.com/office/drawing/2014/main" id="{19821F4E-8F85-4340-9F21-32DDE9F511E9}"/>
+              </a:ext>
+            </a:extLst>
+          </p:cNvPr>
+          <p:cNvSpPr txBox="1">
+            <a:spLocks noChangeAspect="1"/>
+          </p:cNvSpPr>
+          <p:nvPr/>
+        </p:nvSpPr>
+        <p:spPr>
+          <a:xfrm>
+            <a:off x="2504763" y="71680"/>
+            <a:ext cx="1281765" cy="720000"/>
+          </a:xfrm>
+          <a:prstGeom prst="rect">
+            <a:avLst/>
+          </a:prstGeom>
+        </p:spPr>
+        <p:txBody>
+          <a:bodyPr vert="horz" lIns="91440" tIns="45720" rIns="91440" bIns="45720" rtlCol="0" anchor="ctr" anchorCtr="1">
+            <a:noAutofit/>
+          </a:bodyPr>
+          <a:lstStyle>
+            <a:lvl1pPr algn="l" defTabSz="914400" rtl="0" eaLnBrk="1" latinLnBrk="0" hangingPunct="1">
+              <a:lnSpc>
+                <a:spcPct val="90000"/>
+              </a:lnSpc>
+              <a:spcBef>
+                <a:spcPct val="0"/>
+              </a:spcBef>
+              <a:buNone/>
+              <a:defRPr sz="3800" kern="1200">
+                <a:solidFill>
+                  <a:srgbClr val="3E606F"/>
+                </a:solidFill>
+                <a:latin typeface="PF Handbook Pro" panose="02000506090000020004" pitchFamily="50" charset="0"/>
+                <a:ea typeface="+mj-ea"/>
+                <a:cs typeface="+mj-cs"/>
+              </a:defRPr>
+            </a:lvl1pPr>
+          </a:lstStyle>
+          <a:p>
+            <a:r>
+              <a:rPr lang="en-US" sz="1800" dirty="0">
+                <a:solidFill>
+                  <a:schemeClr val="tx1"/>
+                </a:solidFill>
+              </a:rPr>
+              <a:t>Q01</a:t>
+            </a:r>
+          </a:p>
+        </p:txBody>
+      </p:sp>
+      <p:sp>
+        <p:nvSpPr>
+          <p:cNvPr id="16" name="Title 1">
+            <a:extLst>
+              <a:ext uri="{FF2B5EF4-FFF2-40B4-BE49-F238E27FC236}">
+                <a16:creationId xmlns:a16="http://schemas.microsoft.com/office/drawing/2014/main" id="{FE6DD2CA-69AB-FF42-9DFD-55E0A43666B7}"/>
+              </a:ext>
+            </a:extLst>
+          </p:cNvPr>
+          <p:cNvSpPr txBox="1">
+            <a:spLocks noChangeAspect="1"/>
+          </p:cNvSpPr>
+          <p:nvPr/>
+        </p:nvSpPr>
+        <p:spPr>
+          <a:xfrm>
+            <a:off x="2504763" y="2710430"/>
+            <a:ext cx="1281765" cy="720000"/>
+          </a:xfrm>
+          <a:prstGeom prst="rect">
+            <a:avLst/>
+          </a:prstGeom>
+        </p:spPr>
+        <p:txBody>
+          <a:bodyPr vert="horz" lIns="91440" tIns="45720" rIns="91440" bIns="45720" rtlCol="0" anchor="ctr" anchorCtr="1">
+            <a:noAutofit/>
+          </a:bodyPr>
+          <a:lstStyle>
+            <a:lvl1pPr algn="l" defTabSz="914400" rtl="0" eaLnBrk="1" latinLnBrk="0" hangingPunct="1">
+              <a:lnSpc>
+                <a:spcPct val="90000"/>
+              </a:lnSpc>
+              <a:spcBef>
+                <a:spcPct val="0"/>
+              </a:spcBef>
+              <a:buNone/>
+              <a:defRPr sz="3800" kern="1200">
+                <a:solidFill>
+                  <a:srgbClr val="3E606F"/>
+                </a:solidFill>
+                <a:latin typeface="PF Handbook Pro" panose="02000506090000020004" pitchFamily="50" charset="0"/>
+                <a:ea typeface="+mj-ea"/>
+                <a:cs typeface="+mj-cs"/>
+              </a:defRPr>
+            </a:lvl1pPr>
+          </a:lstStyle>
+          <a:p>
+            <a:r>
+              <a:rPr lang="en-US" sz="1800" dirty="0">
+                <a:solidFill>
+                  <a:schemeClr val="tx1"/>
+                </a:solidFill>
+              </a:rPr>
+              <a:t>Q06</a:t>
+            </a:r>
+          </a:p>
+        </p:txBody>
+      </p:sp>
+    </p:spTree>
+    <p:extLst>
+      <p:ext uri="{BB962C8B-B14F-4D97-AF65-F5344CB8AC3E}">
+        <p14:creationId xmlns:p14="http://schemas.microsoft.com/office/powerpoint/2010/main" val="4030205462"/>
+      </p:ext>
+    </p:extLst>
+  </p:cSld>
+  <p:clrMapOvr>
+    <a:masterClrMapping/>
+  </p:clrMapOvr>
+</p:sld>
+</file>
+
+<file path=ppt/slides/slide2.xml><?xml version="1.0" encoding="utf-8"?>
+<p:sld xmlns:a="http://schemas.openxmlformats.org/drawingml/2006/main" xmlns:r="http://schemas.openxmlformats.org/officeDocument/2006/relationships" xmlns:p="http://schemas.openxmlformats.org/presentationml/2006/main">
   <p:cSld>
     <p:spTree>
       <p:nvGrpSpPr>
@@ -2965,13 +4009,13 @@
         </p:nvCxnSpPr>
         <p:spPr>
           <a:xfrm>
-            <a:off x="1050263" y="997200"/>
-            <a:ext cx="0" cy="5522970"/>
+            <a:off x="353253" y="60972"/>
+            <a:ext cx="0" cy="4939472"/>
           </a:xfrm>
           <a:prstGeom prst="straightConnector1">
             <a:avLst/>
           </a:prstGeom>
-          <a:ln w="63500">
+          <a:ln w="38100">
             <a:solidFill>
               <a:schemeClr val="tx1"/>
             </a:solidFill>
@@ -3008,7 +4052,7 @@
         </p:nvGrpSpPr>
         <p:grpSpPr>
           <a:xfrm>
-            <a:off x="1146291" y="1201404"/>
+            <a:off x="449281" y="0"/>
             <a:ext cx="4928782" cy="2520000"/>
             <a:chOff x="1146291" y="1201404"/>
             <a:chExt cx="4928782" cy="2520000"/>
@@ -3029,7 +4073,7 @@
             <p:nvPr/>
           </p:nvPicPr>
           <p:blipFill rotWithShape="1">
-            <a:blip r:embed="rId2">
+            <a:blip r:embed="rId3">
               <a:extLst>
                 <a:ext uri="{28A0092B-C50C-407E-A947-70E740481C1C}">
                   <a14:useLocalDpi xmlns:a14="http://schemas.microsoft.com/office/drawing/2010/main" val="0"/>
@@ -3065,7 +4109,7 @@
           </p:nvSpPr>
           <p:spPr>
             <a:xfrm>
-              <a:off x="3201773" y="2234978"/>
+              <a:off x="3201773" y="1284954"/>
               <a:ext cx="1281765" cy="720000"/>
             </a:xfrm>
             <a:prstGeom prst="rect">
@@ -3110,6 +4154,311 @@
       </p:grpSp>
       <p:grpSp>
         <p:nvGrpSpPr>
+          <p:cNvPr id="9" name="Group 8">
+            <a:extLst>
+              <a:ext uri="{FF2B5EF4-FFF2-40B4-BE49-F238E27FC236}">
+                <a16:creationId xmlns:a16="http://schemas.microsoft.com/office/drawing/2014/main" id="{BC47B836-5F49-6B40-8D9F-D916B922C882}"/>
+              </a:ext>
+            </a:extLst>
+          </p:cNvPr>
+          <p:cNvGrpSpPr/>
+          <p:nvPr/>
+        </p:nvGrpSpPr>
+        <p:grpSpPr>
+          <a:xfrm>
+            <a:off x="486021" y="2640248"/>
+            <a:ext cx="4892042" cy="2520000"/>
+            <a:chOff x="1183031" y="3841652"/>
+            <a:chExt cx="4892042" cy="2520000"/>
+          </a:xfrm>
+        </p:grpSpPr>
+        <p:pic>
+          <p:nvPicPr>
+            <p:cNvPr id="8" name="Picture 7">
+              <a:extLst>
+                <a:ext uri="{FF2B5EF4-FFF2-40B4-BE49-F238E27FC236}">
+                  <a16:creationId xmlns:a16="http://schemas.microsoft.com/office/drawing/2014/main" id="{8216DC89-55AF-B442-895D-8E1B8139BD31}"/>
+                </a:ext>
+              </a:extLst>
+            </p:cNvPr>
+            <p:cNvPicPr>
+              <a:picLocks/>
+            </p:cNvPicPr>
+            <p:nvPr/>
+          </p:nvPicPr>
+          <p:blipFill rotWithShape="1">
+            <a:blip r:embed="rId4">
+              <a:extLst>
+                <a:ext uri="{28A0092B-C50C-407E-A947-70E740481C1C}">
+                  <a14:useLocalDpi xmlns:a14="http://schemas.microsoft.com/office/drawing/2010/main" val="0"/>
+                </a:ext>
+              </a:extLst>
+            </a:blip>
+            <a:srcRect l="7959" t="10929" r="8301" b="5771"/>
+            <a:stretch/>
+          </p:blipFill>
+          <p:spPr>
+            <a:xfrm>
+              <a:off x="1183031" y="3841652"/>
+              <a:ext cx="4892042" cy="2520000"/>
+            </a:xfrm>
+            <a:prstGeom prst="rect">
+              <a:avLst/>
+            </a:prstGeom>
+          </p:spPr>
+        </p:pic>
+        <p:sp>
+          <p:nvSpPr>
+            <p:cNvPr id="23" name="Title 1">
+              <a:extLst>
+                <a:ext uri="{FF2B5EF4-FFF2-40B4-BE49-F238E27FC236}">
+                  <a16:creationId xmlns:a16="http://schemas.microsoft.com/office/drawing/2014/main" id="{BFEBFBC4-1F24-C344-BE34-D97AFCAEB8CB}"/>
+                </a:ext>
+              </a:extLst>
+            </p:cNvPr>
+            <p:cNvSpPr txBox="1">
+              <a:spLocks noChangeAspect="1"/>
+            </p:cNvSpPr>
+            <p:nvPr/>
+          </p:nvSpPr>
+          <p:spPr>
+            <a:xfrm>
+              <a:off x="3201773" y="3888081"/>
+              <a:ext cx="1281765" cy="720000"/>
+            </a:xfrm>
+            <a:prstGeom prst="rect">
+              <a:avLst/>
+            </a:prstGeom>
+          </p:spPr>
+          <p:txBody>
+            <a:bodyPr vert="horz" lIns="91440" tIns="45720" rIns="91440" bIns="45720" rtlCol="0" anchor="ctr" anchorCtr="1">
+              <a:noAutofit/>
+            </a:bodyPr>
+            <a:lstStyle>
+              <a:lvl1pPr algn="l" defTabSz="914400" rtl="0" eaLnBrk="1" latinLnBrk="0" hangingPunct="1">
+                <a:lnSpc>
+                  <a:spcPct val="90000"/>
+                </a:lnSpc>
+                <a:spcBef>
+                  <a:spcPct val="0"/>
+                </a:spcBef>
+                <a:buNone/>
+                <a:defRPr sz="3800" kern="1200">
+                  <a:solidFill>
+                    <a:srgbClr val="3E606F"/>
+                  </a:solidFill>
+                  <a:latin typeface="PF Handbook Pro" panose="02000506090000020004" pitchFamily="50" charset="0"/>
+                  <a:ea typeface="+mj-ea"/>
+                  <a:cs typeface="+mj-cs"/>
+                </a:defRPr>
+              </a:lvl1pPr>
+            </a:lstStyle>
+            <a:p>
+              <a:r>
+                <a:rPr lang="en-US" sz="1800" dirty="0">
+                  <a:solidFill>
+                    <a:schemeClr val="tx1"/>
+                  </a:solidFill>
+                </a:rPr>
+                <a:t>Q15</a:t>
+              </a:r>
+            </a:p>
+          </p:txBody>
+        </p:sp>
+      </p:grpSp>
+      <p:sp>
+        <p:nvSpPr>
+          <p:cNvPr id="30" name="Title 1">
+            <a:extLst>
+              <a:ext uri="{FF2B5EF4-FFF2-40B4-BE49-F238E27FC236}">
+                <a16:creationId xmlns:a16="http://schemas.microsoft.com/office/drawing/2014/main" id="{48FBE1B6-FD09-DB4D-B75A-E6E42041D40D}"/>
+              </a:ext>
+            </a:extLst>
+          </p:cNvPr>
+          <p:cNvSpPr txBox="1">
+            <a:spLocks noChangeAspect="1"/>
+          </p:cNvSpPr>
+          <p:nvPr/>
+        </p:nvSpPr>
+        <p:spPr>
+          <a:xfrm rot="16200000">
+            <a:off x="-2169723" y="2434899"/>
+            <a:ext cx="4735269" cy="395822"/>
+          </a:xfrm>
+          <a:prstGeom prst="rect">
+            <a:avLst/>
+          </a:prstGeom>
+        </p:spPr>
+        <p:txBody>
+          <a:bodyPr vert="horz" lIns="91440" tIns="45720" rIns="91440" bIns="45720" rtlCol="0" anchor="ctr" anchorCtr="1">
+            <a:noAutofit/>
+          </a:bodyPr>
+          <a:lstStyle>
+            <a:lvl1pPr algn="l" defTabSz="914400" rtl="0" eaLnBrk="1" latinLnBrk="0" hangingPunct="1">
+              <a:lnSpc>
+                <a:spcPct val="90000"/>
+              </a:lnSpc>
+              <a:spcBef>
+                <a:spcPct val="0"/>
+              </a:spcBef>
+              <a:buNone/>
+              <a:defRPr sz="3800" kern="1200">
+                <a:solidFill>
+                  <a:srgbClr val="3E606F"/>
+                </a:solidFill>
+                <a:latin typeface="PF Handbook Pro" panose="02000506090000020004" pitchFamily="50" charset="0"/>
+                <a:ea typeface="+mj-ea"/>
+                <a:cs typeface="+mj-cs"/>
+              </a:defRPr>
+            </a:lvl1pPr>
+          </a:lstStyle>
+          <a:p>
+            <a:r>
+              <a:rPr lang="en-US" sz="1600" dirty="0">
+                <a:solidFill>
+                  <a:schemeClr val="tx1"/>
+                </a:solidFill>
+              </a:rPr>
+              <a:t>deviation = (estimated – actual)/actual*100</a:t>
+            </a:r>
+          </a:p>
+        </p:txBody>
+      </p:sp>
+      <p:cxnSp>
+        <p:nvCxnSpPr>
+          <p:cNvPr id="31" name="Straight Arrow Connector 30">
+            <a:extLst>
+              <a:ext uri="{FF2B5EF4-FFF2-40B4-BE49-F238E27FC236}">
+                <a16:creationId xmlns:a16="http://schemas.microsoft.com/office/drawing/2014/main" id="{89ABA125-54C2-7144-A736-1D4682176369}"/>
+              </a:ext>
+            </a:extLst>
+          </p:cNvPr>
+          <p:cNvCxnSpPr>
+            <a:cxnSpLocks/>
+          </p:cNvCxnSpPr>
+          <p:nvPr/>
+        </p:nvCxnSpPr>
+        <p:spPr>
+          <a:xfrm flipH="1">
+            <a:off x="713232" y="5240223"/>
+            <a:ext cx="4603021" cy="0"/>
+          </a:xfrm>
+          <a:prstGeom prst="straightConnector1">
+            <a:avLst/>
+          </a:prstGeom>
+          <a:ln w="38100">
+            <a:solidFill>
+              <a:schemeClr val="tx1"/>
+            </a:solidFill>
+            <a:headEnd type="triangle"/>
+            <a:tailEnd type="none"/>
+          </a:ln>
+        </p:spPr>
+        <p:style>
+          <a:lnRef idx="1">
+            <a:schemeClr val="accent1"/>
+          </a:lnRef>
+          <a:fillRef idx="0">
+            <a:schemeClr val="accent1"/>
+          </a:fillRef>
+          <a:effectRef idx="0">
+            <a:schemeClr val="accent1"/>
+          </a:effectRef>
+          <a:fontRef idx="minor">
+            <a:schemeClr val="tx1"/>
+          </a:fontRef>
+        </p:style>
+      </p:cxnSp>
+      <p:sp>
+        <p:nvSpPr>
+          <p:cNvPr id="32" name="Title 1">
+            <a:extLst>
+              <a:ext uri="{FF2B5EF4-FFF2-40B4-BE49-F238E27FC236}">
+                <a16:creationId xmlns:a16="http://schemas.microsoft.com/office/drawing/2014/main" id="{94DF5E4F-DE0A-B64B-B093-905CC0A4118E}"/>
+              </a:ext>
+            </a:extLst>
+          </p:cNvPr>
+          <p:cNvSpPr txBox="1">
+            <a:spLocks noChangeAspect="1"/>
+          </p:cNvSpPr>
+          <p:nvPr/>
+        </p:nvSpPr>
+        <p:spPr>
+          <a:xfrm>
+            <a:off x="713232" y="5210601"/>
+            <a:ext cx="4407408" cy="395822"/>
+          </a:xfrm>
+          <a:prstGeom prst="rect">
+            <a:avLst/>
+          </a:prstGeom>
+        </p:spPr>
+        <p:txBody>
+          <a:bodyPr vert="horz" lIns="91440" tIns="45720" rIns="91440" bIns="45720" rtlCol="0" anchor="ctr" anchorCtr="1">
+            <a:noAutofit/>
+          </a:bodyPr>
+          <a:lstStyle>
+            <a:lvl1pPr algn="l" defTabSz="914400" rtl="0" eaLnBrk="1" latinLnBrk="0" hangingPunct="1">
+              <a:lnSpc>
+                <a:spcPct val="90000"/>
+              </a:lnSpc>
+              <a:spcBef>
+                <a:spcPct val="0"/>
+              </a:spcBef>
+              <a:buNone/>
+              <a:defRPr sz="3800" kern="1200">
+                <a:solidFill>
+                  <a:srgbClr val="3E606F"/>
+                </a:solidFill>
+                <a:latin typeface="PF Handbook Pro" panose="02000506090000020004" pitchFamily="50" charset="0"/>
+                <a:ea typeface="+mj-ea"/>
+                <a:cs typeface="+mj-cs"/>
+              </a:defRPr>
+            </a:lvl1pPr>
+          </a:lstStyle>
+          <a:p>
+            <a:r>
+              <a:rPr lang="en-US" sz="1600" dirty="0">
+                <a:solidFill>
+                  <a:schemeClr val="tx1"/>
+                </a:solidFill>
+              </a:rPr>
+              <a:t>No. of training queries</a:t>
+            </a:r>
+          </a:p>
+        </p:txBody>
+      </p:sp>
+    </p:spTree>
+    <p:extLst>
+      <p:ext uri="{BB962C8B-B14F-4D97-AF65-F5344CB8AC3E}">
+        <p14:creationId xmlns:p14="http://schemas.microsoft.com/office/powerpoint/2010/main" val="2602316990"/>
+      </p:ext>
+    </p:extLst>
+  </p:cSld>
+  <p:clrMapOvr>
+    <a:masterClrMapping/>
+  </p:clrMapOvr>
+</p:sld>
+</file>
+
+<file path=ppt/slides/slide3.xml><?xml version="1.0" encoding="utf-8"?>
+<p:sld xmlns:a="http://schemas.openxmlformats.org/drawingml/2006/main" xmlns:r="http://schemas.openxmlformats.org/officeDocument/2006/relationships" xmlns:p="http://schemas.openxmlformats.org/presentationml/2006/main">
+  <p:cSld>
+    <p:spTree>
+      <p:nvGrpSpPr>
+        <p:cNvPr id="1" name=""/>
+        <p:cNvGrpSpPr/>
+        <p:nvPr/>
+      </p:nvGrpSpPr>
+      <p:grpSpPr>
+        <a:xfrm>
+          <a:off x="0" y="0"/>
+          <a:ext cx="0" cy="0"/>
+          <a:chOff x="0" y="0"/>
+          <a:chExt cx="0" cy="0"/>
+        </a:xfrm>
+      </p:grpSpPr>
+      <p:grpSp>
+        <p:nvGrpSpPr>
           <p:cNvPr id="5" name="Group 4">
             <a:extLst>
               <a:ext uri="{FF2B5EF4-FFF2-40B4-BE49-F238E27FC236}">
@@ -3122,7 +4471,7 @@
         </p:nvGrpSpPr>
         <p:grpSpPr>
           <a:xfrm>
-            <a:off x="6775808" y="1249903"/>
+            <a:off x="395823" y="48303"/>
             <a:ext cx="4934877" cy="2520000"/>
             <a:chOff x="6386699" y="1249903"/>
             <a:chExt cx="4934877" cy="2520000"/>
@@ -3179,7 +4528,7 @@
           </p:nvSpPr>
           <p:spPr>
             <a:xfrm>
-              <a:off x="8350717" y="2234978"/>
+              <a:off x="8350717" y="1308705"/>
               <a:ext cx="1281765" cy="720000"/>
             </a:xfrm>
             <a:prstGeom prst="rect">
@@ -3224,120 +4573,6 @@
       </p:grpSp>
       <p:grpSp>
         <p:nvGrpSpPr>
-          <p:cNvPr id="9" name="Group 8">
-            <a:extLst>
-              <a:ext uri="{FF2B5EF4-FFF2-40B4-BE49-F238E27FC236}">
-                <a16:creationId xmlns:a16="http://schemas.microsoft.com/office/drawing/2014/main" id="{BC47B836-5F49-6B40-8D9F-D916B922C882}"/>
-              </a:ext>
-            </a:extLst>
-          </p:cNvPr>
-          <p:cNvGrpSpPr/>
-          <p:nvPr/>
-        </p:nvGrpSpPr>
-        <p:grpSpPr>
-          <a:xfrm>
-            <a:off x="1183031" y="3841652"/>
-            <a:ext cx="4892042" cy="2520000"/>
-            <a:chOff x="1183031" y="3841652"/>
-            <a:chExt cx="4892042" cy="2520000"/>
-          </a:xfrm>
-        </p:grpSpPr>
-        <p:pic>
-          <p:nvPicPr>
-            <p:cNvPr id="8" name="Picture 7">
-              <a:extLst>
-                <a:ext uri="{FF2B5EF4-FFF2-40B4-BE49-F238E27FC236}">
-                  <a16:creationId xmlns:a16="http://schemas.microsoft.com/office/drawing/2014/main" id="{8216DC89-55AF-B442-895D-8E1B8139BD31}"/>
-                </a:ext>
-              </a:extLst>
-            </p:cNvPr>
-            <p:cNvPicPr>
-              <a:picLocks/>
-            </p:cNvPicPr>
-            <p:nvPr/>
-          </p:nvPicPr>
-          <p:blipFill rotWithShape="1">
-            <a:blip r:embed="rId4">
-              <a:extLst>
-                <a:ext uri="{28A0092B-C50C-407E-A947-70E740481C1C}">
-                  <a14:useLocalDpi xmlns:a14="http://schemas.microsoft.com/office/drawing/2010/main" val="0"/>
-                </a:ext>
-              </a:extLst>
-            </a:blip>
-            <a:srcRect l="7959" t="10929" r="8301" b="5771"/>
-            <a:stretch/>
-          </p:blipFill>
-          <p:spPr>
-            <a:xfrm>
-              <a:off x="1183031" y="3841652"/>
-              <a:ext cx="4892042" cy="2520000"/>
-            </a:xfrm>
-            <a:prstGeom prst="rect">
-              <a:avLst/>
-            </a:prstGeom>
-          </p:spPr>
-        </p:pic>
-        <p:sp>
-          <p:nvSpPr>
-            <p:cNvPr id="23" name="Title 1">
-              <a:extLst>
-                <a:ext uri="{FF2B5EF4-FFF2-40B4-BE49-F238E27FC236}">
-                  <a16:creationId xmlns:a16="http://schemas.microsoft.com/office/drawing/2014/main" id="{BFEBFBC4-1F24-C344-BE34-D97AFCAEB8CB}"/>
-                </a:ext>
-              </a:extLst>
-            </p:cNvPr>
-            <p:cNvSpPr txBox="1">
-              <a:spLocks noChangeAspect="1"/>
-            </p:cNvSpPr>
-            <p:nvPr/>
-          </p:nvSpPr>
-          <p:spPr>
-            <a:xfrm>
-              <a:off x="3201773" y="4754978"/>
-              <a:ext cx="1281765" cy="720000"/>
-            </a:xfrm>
-            <a:prstGeom prst="rect">
-              <a:avLst/>
-            </a:prstGeom>
-          </p:spPr>
-          <p:txBody>
-            <a:bodyPr vert="horz" lIns="91440" tIns="45720" rIns="91440" bIns="45720" rtlCol="0" anchor="ctr" anchorCtr="1">
-              <a:noAutofit/>
-            </a:bodyPr>
-            <a:lstStyle>
-              <a:lvl1pPr algn="l" defTabSz="914400" rtl="0" eaLnBrk="1" latinLnBrk="0" hangingPunct="1">
-                <a:lnSpc>
-                  <a:spcPct val="90000"/>
-                </a:lnSpc>
-                <a:spcBef>
-                  <a:spcPct val="0"/>
-                </a:spcBef>
-                <a:buNone/>
-                <a:defRPr sz="3800" kern="1200">
-                  <a:solidFill>
-                    <a:srgbClr val="3E606F"/>
-                  </a:solidFill>
-                  <a:latin typeface="PF Handbook Pro" panose="02000506090000020004" pitchFamily="50" charset="0"/>
-                  <a:ea typeface="+mj-ea"/>
-                  <a:cs typeface="+mj-cs"/>
-                </a:defRPr>
-              </a:lvl1pPr>
-            </a:lstStyle>
-            <a:p>
-              <a:r>
-                <a:rPr lang="en-US" sz="1800" dirty="0">
-                  <a:solidFill>
-                    <a:schemeClr val="tx1"/>
-                  </a:solidFill>
-                </a:rPr>
-                <a:t>Q15</a:t>
-              </a:r>
-            </a:p>
-          </p:txBody>
-        </p:sp>
-      </p:grpSp>
-      <p:grpSp>
-        <p:nvGrpSpPr>
           <p:cNvPr id="7" name="Group 6">
             <a:extLst>
               <a:ext uri="{FF2B5EF4-FFF2-40B4-BE49-F238E27FC236}">
@@ -3350,7 +4585,7 @@
         </p:nvGrpSpPr>
         <p:grpSpPr>
           <a:xfrm>
-            <a:off x="6808717" y="3841850"/>
+            <a:off x="428732" y="2640250"/>
             <a:ext cx="4901968" cy="2520000"/>
             <a:chOff x="6419608" y="3841850"/>
             <a:chExt cx="4901968" cy="2520000"/>
@@ -3371,7 +4606,7 @@
             <p:nvPr/>
           </p:nvPicPr>
           <p:blipFill rotWithShape="1">
-            <a:blip r:embed="rId5">
+            <a:blip r:embed="rId4">
               <a:extLst>
                 <a:ext uri="{28A0092B-C50C-407E-A947-70E740481C1C}">
                   <a14:useLocalDpi xmlns:a14="http://schemas.microsoft.com/office/drawing/2010/main" val="0"/>
@@ -3407,7 +4642,7 @@
           </p:nvSpPr>
           <p:spPr>
             <a:xfrm>
-              <a:off x="8350717" y="4042800"/>
+              <a:off x="8350717" y="3900296"/>
               <a:ext cx="1281765" cy="720000"/>
             </a:xfrm>
             <a:prstGeom prst="rect">
@@ -3452,10 +4687,10 @@
       </p:grpSp>
       <p:cxnSp>
         <p:nvCxnSpPr>
-          <p:cNvPr id="28" name="Straight Arrow Connector 27">
+          <p:cNvPr id="19" name="Straight Arrow Connector 18">
             <a:extLst>
               <a:ext uri="{FF2B5EF4-FFF2-40B4-BE49-F238E27FC236}">
-                <a16:creationId xmlns:a16="http://schemas.microsoft.com/office/drawing/2014/main" id="{52F0D8B3-049F-A640-8723-D67B9925AAF7}"/>
+                <a16:creationId xmlns:a16="http://schemas.microsoft.com/office/drawing/2014/main" id="{EF4C0393-0B85-C946-A906-E624A3C16C51}"/>
               </a:ext>
             </a:extLst>
           </p:cNvPr>
@@ -3466,13 +4701,13 @@
         </p:nvCxnSpPr>
         <p:spPr>
           <a:xfrm>
-            <a:off x="6746757" y="997005"/>
-            <a:ext cx="0" cy="5522970"/>
+            <a:off x="353253" y="60972"/>
+            <a:ext cx="0" cy="4939472"/>
           </a:xfrm>
           <a:prstGeom prst="straightConnector1">
             <a:avLst/>
           </a:prstGeom>
-          <a:ln w="63500">
+          <a:ln w="38100">
             <a:solidFill>
               <a:schemeClr val="tx1"/>
             </a:solidFill>
@@ -3497,10 +4732,10 @@
       </p:cxnSp>
       <p:sp>
         <p:nvSpPr>
-          <p:cNvPr id="29" name="Title 1">
+          <p:cNvPr id="20" name="Title 1">
             <a:extLst>
               <a:ext uri="{FF2B5EF4-FFF2-40B4-BE49-F238E27FC236}">
-                <a16:creationId xmlns:a16="http://schemas.microsoft.com/office/drawing/2014/main" id="{72B34A65-4470-6242-98C4-C6C3DB682F90}"/>
+                <a16:creationId xmlns:a16="http://schemas.microsoft.com/office/drawing/2014/main" id="{D41D4920-5283-AB4A-AC56-B10953301A85}"/>
               </a:ext>
             </a:extLst>
           </p:cNvPr>
@@ -3511,8 +4746,8 @@
         </p:nvSpPr>
         <p:spPr>
           <a:xfrm rot="16200000">
-            <a:off x="4481214" y="3520266"/>
-            <a:ext cx="4226776" cy="395822"/>
+            <a:off x="-2213245" y="2391376"/>
+            <a:ext cx="4822314" cy="395822"/>
           </a:xfrm>
           <a:prstGeom prst="rect">
             <a:avLst/>
@@ -3543,226 +4778,22 @@
           </a:lstStyle>
           <a:p>
             <a:r>
-              <a:rPr lang="en-US" sz="1800" dirty="0">
+              <a:rPr lang="en-US" sz="1600" dirty="0">
                 <a:solidFill>
                   <a:schemeClr val="tx1"/>
                 </a:solidFill>
               </a:rPr>
-              <a:t>deviation = (estimated – actual)/actual</a:t>
-            </a:r>
-          </a:p>
-        </p:txBody>
-      </p:sp>
-      <p:sp>
-        <p:nvSpPr>
-          <p:cNvPr id="30" name="Title 1">
+              <a:t>deviation = (estimated – actual)/actual*100</a:t>
+            </a:r>
+          </a:p>
+        </p:txBody>
+      </p:sp>
+      <p:cxnSp>
+        <p:nvCxnSpPr>
+          <p:cNvPr id="25" name="Straight Arrow Connector 24">
             <a:extLst>
               <a:ext uri="{FF2B5EF4-FFF2-40B4-BE49-F238E27FC236}">
-                <a16:creationId xmlns:a16="http://schemas.microsoft.com/office/drawing/2014/main" id="{48FBE1B6-FD09-DB4D-B75A-E6E42041D40D}"/>
-              </a:ext>
-            </a:extLst>
-          </p:cNvPr>
-          <p:cNvSpPr txBox="1">
-            <a:spLocks noChangeAspect="1"/>
-          </p:cNvSpPr>
-          <p:nvPr/>
-        </p:nvSpPr>
-        <p:spPr>
-          <a:xfrm rot="16200000">
-            <a:off x="-1218466" y="3520800"/>
-            <a:ext cx="4226776" cy="395822"/>
-          </a:xfrm>
-          <a:prstGeom prst="rect">
-            <a:avLst/>
-          </a:prstGeom>
-        </p:spPr>
-        <p:txBody>
-          <a:bodyPr vert="horz" lIns="91440" tIns="45720" rIns="91440" bIns="45720" rtlCol="0" anchor="ctr" anchorCtr="1">
-            <a:noAutofit/>
-          </a:bodyPr>
-          <a:lstStyle>
-            <a:lvl1pPr algn="l" defTabSz="914400" rtl="0" eaLnBrk="1" latinLnBrk="0" hangingPunct="1">
-              <a:lnSpc>
-                <a:spcPct val="90000"/>
-              </a:lnSpc>
-              <a:spcBef>
-                <a:spcPct val="0"/>
-              </a:spcBef>
-              <a:buNone/>
-              <a:defRPr sz="3800" kern="1200">
-                <a:solidFill>
-                  <a:srgbClr val="3E606F"/>
-                </a:solidFill>
-                <a:latin typeface="PF Handbook Pro" panose="02000506090000020004" pitchFamily="50" charset="0"/>
-                <a:ea typeface="+mj-ea"/>
-                <a:cs typeface="+mj-cs"/>
-              </a:defRPr>
-            </a:lvl1pPr>
-          </a:lstStyle>
-          <a:p>
-            <a:r>
-              <a:rPr lang="en-US" sz="1800" dirty="0">
-                <a:solidFill>
-                  <a:schemeClr val="tx1"/>
-                </a:solidFill>
-              </a:rPr>
-              <a:t>deviation = (estimated – actual)/actual</a:t>
-            </a:r>
-          </a:p>
-        </p:txBody>
-      </p:sp>
-    </p:spTree>
-    <p:extLst>
-      <p:ext uri="{BB962C8B-B14F-4D97-AF65-F5344CB8AC3E}">
-        <p14:creationId xmlns:p14="http://schemas.microsoft.com/office/powerpoint/2010/main" val="2602316990"/>
-      </p:ext>
-    </p:extLst>
-  </p:cSld>
-  <p:clrMapOvr>
-    <a:masterClrMapping/>
-  </p:clrMapOvr>
-</p:sld>
-</file>
-
-<file path=ppt/slides/slide2.xml><?xml version="1.0" encoding="utf-8"?>
-<p:sld xmlns:a="http://schemas.openxmlformats.org/drawingml/2006/main" xmlns:r="http://schemas.openxmlformats.org/officeDocument/2006/relationships" xmlns:p="http://schemas.openxmlformats.org/presentationml/2006/main">
-  <p:cSld>
-    <p:spTree>
-      <p:nvGrpSpPr>
-        <p:cNvPr id="1" name=""/>
-        <p:cNvGrpSpPr/>
-        <p:nvPr/>
-      </p:nvGrpSpPr>
-      <p:grpSpPr>
-        <a:xfrm>
-          <a:off x="0" y="0"/>
-          <a:ext cx="0" cy="0"/>
-          <a:chOff x="0" y="0"/>
-          <a:chExt cx="0" cy="0"/>
-        </a:xfrm>
-      </p:grpSpPr>
-      <p:sp>
-        <p:nvSpPr>
-          <p:cNvPr id="30" name="Title 1">
-            <a:extLst>
-              <a:ext uri="{FF2B5EF4-FFF2-40B4-BE49-F238E27FC236}">
-                <a16:creationId xmlns:a16="http://schemas.microsoft.com/office/drawing/2014/main" id="{48FBE1B6-FD09-DB4D-B75A-E6E42041D40D}"/>
-              </a:ext>
-            </a:extLst>
-          </p:cNvPr>
-          <p:cNvSpPr txBox="1">
-            <a:spLocks noChangeAspect="1"/>
-          </p:cNvSpPr>
-          <p:nvPr/>
-        </p:nvSpPr>
-        <p:spPr>
-          <a:xfrm rot="16200000">
-            <a:off x="-1218466" y="3570228"/>
-            <a:ext cx="4226776" cy="395822"/>
-          </a:xfrm>
-          <a:prstGeom prst="rect">
-            <a:avLst/>
-          </a:prstGeom>
-        </p:spPr>
-        <p:txBody>
-          <a:bodyPr vert="horz" lIns="91440" tIns="45720" rIns="91440" bIns="45720" rtlCol="0" anchor="ctr" anchorCtr="1">
-            <a:noAutofit/>
-          </a:bodyPr>
-          <a:lstStyle>
-            <a:lvl1pPr algn="l" defTabSz="914400" rtl="0" eaLnBrk="1" latinLnBrk="0" hangingPunct="1">
-              <a:lnSpc>
-                <a:spcPct val="90000"/>
-              </a:lnSpc>
-              <a:spcBef>
-                <a:spcPct val="0"/>
-              </a:spcBef>
-              <a:buNone/>
-              <a:defRPr sz="3800" kern="1200">
-                <a:solidFill>
-                  <a:srgbClr val="3E606F"/>
-                </a:solidFill>
-                <a:latin typeface="PF Handbook Pro" panose="02000506090000020004" pitchFamily="50" charset="0"/>
-                <a:ea typeface="+mj-ea"/>
-                <a:cs typeface="+mj-cs"/>
-              </a:defRPr>
-            </a:lvl1pPr>
-          </a:lstStyle>
-          <a:p>
-            <a:r>
-              <a:rPr lang="en-US" sz="1800" dirty="0">
-                <a:solidFill>
-                  <a:schemeClr val="tx1"/>
-                </a:solidFill>
-              </a:rPr>
-              <a:t>deviation = (estimated – actual)/actual</a:t>
-            </a:r>
-          </a:p>
-        </p:txBody>
-      </p:sp>
-      <p:pic>
-        <p:nvPicPr>
-          <p:cNvPr id="10" name="Picture 9">
-            <a:extLst>
-              <a:ext uri="{FF2B5EF4-FFF2-40B4-BE49-F238E27FC236}">
-                <a16:creationId xmlns:a16="http://schemas.microsoft.com/office/drawing/2014/main" id="{44E527A8-AE1F-F54D-AE65-2A01E3E6C102}"/>
-              </a:ext>
-            </a:extLst>
-          </p:cNvPr>
-          <p:cNvPicPr>
-            <a:picLocks/>
-          </p:cNvPicPr>
-          <p:nvPr/>
-        </p:nvPicPr>
-        <p:blipFill rotWithShape="1">
-          <a:blip r:embed="rId2"/>
-          <a:srcRect t="8806" r="3480" b="6270"/>
-          <a:stretch/>
-        </p:blipFill>
-        <p:spPr>
-          <a:xfrm>
-            <a:off x="1106980" y="1202400"/>
-            <a:ext cx="5354505" cy="2520000"/>
-          </a:xfrm>
-          <a:prstGeom prst="rect">
-            <a:avLst/>
-          </a:prstGeom>
-        </p:spPr>
-      </p:pic>
-      <p:pic>
-        <p:nvPicPr>
-          <p:cNvPr id="13" name="Picture 12">
-            <a:extLst>
-              <a:ext uri="{FF2B5EF4-FFF2-40B4-BE49-F238E27FC236}">
-                <a16:creationId xmlns:a16="http://schemas.microsoft.com/office/drawing/2014/main" id="{49142651-DF9C-2040-9F9F-ADC4EB5F776B}"/>
-              </a:ext>
-            </a:extLst>
-          </p:cNvPr>
-          <p:cNvPicPr>
-            <a:picLocks noChangeAspect="1"/>
-          </p:cNvPicPr>
-          <p:nvPr/>
-        </p:nvPicPr>
-        <p:blipFill rotWithShape="1">
-          <a:blip r:embed="rId3"/>
-          <a:srcRect t="5506" r="2971" b="3779"/>
-          <a:stretch/>
-        </p:blipFill>
-        <p:spPr>
-          <a:xfrm>
-            <a:off x="1036116" y="3841200"/>
-            <a:ext cx="5438556" cy="2520000"/>
-          </a:xfrm>
-          <a:prstGeom prst="rect">
-            <a:avLst/>
-          </a:prstGeom>
-        </p:spPr>
-      </p:pic>
-      <p:cxnSp>
-        <p:nvCxnSpPr>
-          <p:cNvPr id="18" name="Straight Arrow Connector 17">
-            <a:extLst>
-              <a:ext uri="{FF2B5EF4-FFF2-40B4-BE49-F238E27FC236}">
-                <a16:creationId xmlns:a16="http://schemas.microsoft.com/office/drawing/2014/main" id="{A254E37E-758D-F84E-AF23-2D4940D34662}"/>
+                <a16:creationId xmlns:a16="http://schemas.microsoft.com/office/drawing/2014/main" id="{90D89425-26FA-E646-9E53-FBE5C2144E03}"/>
               </a:ext>
             </a:extLst>
           </p:cNvPr>
@@ -3772,14 +4803,14 @@
           <p:nvPr/>
         </p:nvCxnSpPr>
         <p:spPr>
-          <a:xfrm>
-            <a:off x="1050263" y="1202400"/>
-            <a:ext cx="0" cy="5181843"/>
+          <a:xfrm flipH="1">
+            <a:off x="713232" y="5240223"/>
+            <a:ext cx="4603021" cy="0"/>
           </a:xfrm>
           <a:prstGeom prst="straightConnector1">
             <a:avLst/>
           </a:prstGeom>
-          <a:ln w="63500">
+          <a:ln w="38100">
             <a:solidFill>
               <a:schemeClr val="tx1"/>
             </a:solidFill>
@@ -3802,10 +4833,68 @@
           </a:fontRef>
         </p:style>
       </p:cxnSp>
+      <p:sp>
+        <p:nvSpPr>
+          <p:cNvPr id="26" name="Title 1">
+            <a:extLst>
+              <a:ext uri="{FF2B5EF4-FFF2-40B4-BE49-F238E27FC236}">
+                <a16:creationId xmlns:a16="http://schemas.microsoft.com/office/drawing/2014/main" id="{28F94AA1-086D-CB45-9672-ECD40FA3A0C7}"/>
+              </a:ext>
+            </a:extLst>
+          </p:cNvPr>
+          <p:cNvSpPr txBox="1">
+            <a:spLocks noChangeAspect="1"/>
+          </p:cNvSpPr>
+          <p:nvPr/>
+        </p:nvSpPr>
+        <p:spPr>
+          <a:xfrm>
+            <a:off x="713232" y="5210601"/>
+            <a:ext cx="4488160" cy="395822"/>
+          </a:xfrm>
+          <a:prstGeom prst="rect">
+            <a:avLst/>
+          </a:prstGeom>
+        </p:spPr>
+        <p:txBody>
+          <a:bodyPr vert="horz" lIns="91440" tIns="45720" rIns="91440" bIns="45720" rtlCol="0" anchor="ctr" anchorCtr="1">
+            <a:noAutofit/>
+          </a:bodyPr>
+          <a:lstStyle>
+            <a:lvl1pPr algn="l" defTabSz="914400" rtl="0" eaLnBrk="1" latinLnBrk="0" hangingPunct="1">
+              <a:lnSpc>
+                <a:spcPct val="90000"/>
+              </a:lnSpc>
+              <a:spcBef>
+                <a:spcPct val="0"/>
+              </a:spcBef>
+              <a:buNone/>
+              <a:defRPr sz="3800" kern="1200">
+                <a:solidFill>
+                  <a:srgbClr val="3E606F"/>
+                </a:solidFill>
+                <a:latin typeface="PF Handbook Pro" panose="02000506090000020004" pitchFamily="50" charset="0"/>
+                <a:ea typeface="+mj-ea"/>
+                <a:cs typeface="+mj-cs"/>
+              </a:defRPr>
+            </a:lvl1pPr>
+          </a:lstStyle>
+          <a:p>
+            <a:r>
+              <a:rPr lang="en-US" sz="1600" dirty="0">
+                <a:solidFill>
+                  <a:schemeClr val="tx1"/>
+                </a:solidFill>
+              </a:rPr>
+              <a:t>No. of training queries</a:t>
+            </a:r>
+          </a:p>
+        </p:txBody>
+      </p:sp>
     </p:spTree>
     <p:extLst>
       <p:ext uri="{BB962C8B-B14F-4D97-AF65-F5344CB8AC3E}">
-        <p14:creationId xmlns:p14="http://schemas.microsoft.com/office/powerpoint/2010/main" val="3981445341"/>
+        <p14:creationId xmlns:p14="http://schemas.microsoft.com/office/powerpoint/2010/main" val="2071660790"/>
       </p:ext>
     </p:extLst>
   </p:cSld>
@@ -4074,4 +5163,299 @@
     </a:ext>
   </a:extLst>
 </a:theme>
+</file>
+
+<file path=ppt/theme/theme2.xml><?xml version="1.0" encoding="utf-8"?>
+<a:theme xmlns:a="http://schemas.openxmlformats.org/drawingml/2006/main" name="Office Theme">
+  <a:themeElements>
+    <a:clrScheme name="Office">
+      <a:dk1>
+        <a:sysClr val="windowText" lastClr="000000"/>
+      </a:dk1>
+      <a:lt1>
+        <a:sysClr val="window" lastClr="FFFFFF"/>
+      </a:lt1>
+      <a:dk2>
+        <a:srgbClr val="44546A"/>
+      </a:dk2>
+      <a:lt2>
+        <a:srgbClr val="E7E6E6"/>
+      </a:lt2>
+      <a:accent1>
+        <a:srgbClr val="4472C4"/>
+      </a:accent1>
+      <a:accent2>
+        <a:srgbClr val="ED7D31"/>
+      </a:accent2>
+      <a:accent3>
+        <a:srgbClr val="A5A5A5"/>
+      </a:accent3>
+      <a:accent4>
+        <a:srgbClr val="FFC000"/>
+      </a:accent4>
+      <a:accent5>
+        <a:srgbClr val="5B9BD5"/>
+      </a:accent5>
+      <a:accent6>
+        <a:srgbClr val="70AD47"/>
+      </a:accent6>
+      <a:hlink>
+        <a:srgbClr val="0563C1"/>
+      </a:hlink>
+      <a:folHlink>
+        <a:srgbClr val="954F72"/>
+      </a:folHlink>
+    </a:clrScheme>
+    <a:fontScheme name="Office">
+      <a:majorFont>
+        <a:latin typeface="Calibri Light" panose="020F0302020204030204"/>
+        <a:ea typeface=""/>
+        <a:cs typeface=""/>
+        <a:font script="Jpan" typeface="游ゴシック Light"/>
+        <a:font script="Hang" typeface="맑은 고딕"/>
+        <a:font script="Hans" typeface="等线 Light"/>
+        <a:font script="Hant" typeface="新細明體"/>
+        <a:font script="Arab" typeface="Times New Roman"/>
+        <a:font script="Hebr" typeface="Times New Roman"/>
+        <a:font script="Thai" typeface="Angsana New"/>
+        <a:font script="Ethi" typeface="Nyala"/>
+        <a:font script="Beng" typeface="Vrinda"/>
+        <a:font script="Gujr" typeface="Shruti"/>
+        <a:font script="Khmr" typeface="MoolBoran"/>
+        <a:font script="Knda" typeface="Tunga"/>
+        <a:font script="Guru" typeface="Raavi"/>
+        <a:font script="Cans" typeface="Euphemia"/>
+        <a:font script="Cher" typeface="Plantagenet Cherokee"/>
+        <a:font script="Yiii" typeface="Microsoft Yi Baiti"/>
+        <a:font script="Tibt" typeface="Microsoft Himalaya"/>
+        <a:font script="Thaa" typeface="MV Boli"/>
+        <a:font script="Deva" typeface="Mangal"/>
+        <a:font script="Telu" typeface="Gautami"/>
+        <a:font script="Taml" typeface="Latha"/>
+        <a:font script="Syrc" typeface="Estrangelo Edessa"/>
+        <a:font script="Orya" typeface="Kalinga"/>
+        <a:font script="Mlym" typeface="Kartika"/>
+        <a:font script="Laoo" typeface="DokChampa"/>
+        <a:font script="Sinh" typeface="Iskoola Pota"/>
+        <a:font script="Mong" typeface="Mongolian Baiti"/>
+        <a:font script="Viet" typeface="Times New Roman"/>
+        <a:font script="Uigh" typeface="Microsoft Uighur"/>
+        <a:font script="Geor" typeface="Sylfaen"/>
+        <a:font script="Armn" typeface="Arial"/>
+        <a:font script="Bugi" typeface="Leelawadee UI"/>
+        <a:font script="Bopo" typeface="Microsoft JhengHei"/>
+        <a:font script="Java" typeface="Javanese Text"/>
+        <a:font script="Lisu" typeface="Segoe UI"/>
+        <a:font script="Mymr" typeface="Myanmar Text"/>
+        <a:font script="Nkoo" typeface="Ebrima"/>
+        <a:font script="Olck" typeface="Nirmala UI"/>
+        <a:font script="Osma" typeface="Ebrima"/>
+        <a:font script="Phag" typeface="Phagspa"/>
+        <a:font script="Syrn" typeface="Estrangelo Edessa"/>
+        <a:font script="Syrj" typeface="Estrangelo Edessa"/>
+        <a:font script="Syre" typeface="Estrangelo Edessa"/>
+        <a:font script="Sora" typeface="Nirmala UI"/>
+        <a:font script="Tale" typeface="Microsoft Tai Le"/>
+        <a:font script="Talu" typeface="Microsoft New Tai Lue"/>
+        <a:font script="Tfng" typeface="Ebrima"/>
+      </a:majorFont>
+      <a:minorFont>
+        <a:latin typeface="Calibri" panose="020F0502020204030204"/>
+        <a:ea typeface=""/>
+        <a:cs typeface=""/>
+        <a:font script="Jpan" typeface="游ゴシック"/>
+        <a:font script="Hang" typeface="맑은 고딕"/>
+        <a:font script="Hans" typeface="等线"/>
+        <a:font script="Hant" typeface="新細明體"/>
+        <a:font script="Arab" typeface="Arial"/>
+        <a:font script="Hebr" typeface="Arial"/>
+        <a:font script="Thai" typeface="Cordia New"/>
+        <a:font script="Ethi" typeface="Nyala"/>
+        <a:font script="Beng" typeface="Vrinda"/>
+        <a:font script="Gujr" typeface="Shruti"/>
+        <a:font script="Khmr" typeface="DaunPenh"/>
+        <a:font script="Knda" typeface="Tunga"/>
+        <a:font script="Guru" typeface="Raavi"/>
+        <a:font script="Cans" typeface="Euphemia"/>
+        <a:font script="Cher" typeface="Plantagenet Cherokee"/>
+        <a:font script="Yiii" typeface="Microsoft Yi Baiti"/>
+        <a:font script="Tibt" typeface="Microsoft Himalaya"/>
+        <a:font script="Thaa" typeface="MV Boli"/>
+        <a:font script="Deva" typeface="Mangal"/>
+        <a:font script="Telu" typeface="Gautami"/>
+        <a:font script="Taml" typeface="Latha"/>
+        <a:font script="Syrc" typeface="Estrangelo Edessa"/>
+        <a:font script="Orya" typeface="Kalinga"/>
+        <a:font script="Mlym" typeface="Kartika"/>
+        <a:font script="Laoo" typeface="DokChampa"/>
+        <a:font script="Sinh" typeface="Iskoola Pota"/>
+        <a:font script="Mong" typeface="Mongolian Baiti"/>
+        <a:font script="Viet" typeface="Arial"/>
+        <a:font script="Uigh" typeface="Microsoft Uighur"/>
+        <a:font script="Geor" typeface="Sylfaen"/>
+        <a:font script="Armn" typeface="Arial"/>
+        <a:font script="Bugi" typeface="Leelawadee UI"/>
+        <a:font script="Bopo" typeface="Microsoft JhengHei"/>
+        <a:font script="Java" typeface="Javanese Text"/>
+        <a:font script="Lisu" typeface="Segoe UI"/>
+        <a:font script="Mymr" typeface="Myanmar Text"/>
+        <a:font script="Nkoo" typeface="Ebrima"/>
+        <a:font script="Olck" typeface="Nirmala UI"/>
+        <a:font script="Osma" typeface="Ebrima"/>
+        <a:font script="Phag" typeface="Phagspa"/>
+        <a:font script="Syrn" typeface="Estrangelo Edessa"/>
+        <a:font script="Syrj" typeface="Estrangelo Edessa"/>
+        <a:font script="Syre" typeface="Estrangelo Edessa"/>
+        <a:font script="Sora" typeface="Nirmala UI"/>
+        <a:font script="Tale" typeface="Microsoft Tai Le"/>
+        <a:font script="Talu" typeface="Microsoft New Tai Lue"/>
+        <a:font script="Tfng" typeface="Ebrima"/>
+      </a:minorFont>
+    </a:fontScheme>
+    <a:fmtScheme name="Office">
+      <a:fillStyleLst>
+        <a:solidFill>
+          <a:schemeClr val="phClr"/>
+        </a:solidFill>
+        <a:gradFill rotWithShape="1">
+          <a:gsLst>
+            <a:gs pos="0">
+              <a:schemeClr val="phClr">
+                <a:lumMod val="110000"/>
+                <a:satMod val="105000"/>
+                <a:tint val="67000"/>
+              </a:schemeClr>
+            </a:gs>
+            <a:gs pos="50000">
+              <a:schemeClr val="phClr">
+                <a:lumMod val="105000"/>
+                <a:satMod val="103000"/>
+                <a:tint val="73000"/>
+              </a:schemeClr>
+            </a:gs>
+            <a:gs pos="100000">
+              <a:schemeClr val="phClr">
+                <a:lumMod val="105000"/>
+                <a:satMod val="109000"/>
+                <a:tint val="81000"/>
+              </a:schemeClr>
+            </a:gs>
+          </a:gsLst>
+          <a:lin ang="5400000" scaled="0"/>
+        </a:gradFill>
+        <a:gradFill rotWithShape="1">
+          <a:gsLst>
+            <a:gs pos="0">
+              <a:schemeClr val="phClr">
+                <a:satMod val="103000"/>
+                <a:lumMod val="102000"/>
+                <a:tint val="94000"/>
+              </a:schemeClr>
+            </a:gs>
+            <a:gs pos="50000">
+              <a:schemeClr val="phClr">
+                <a:satMod val="110000"/>
+                <a:lumMod val="100000"/>
+                <a:shade val="100000"/>
+              </a:schemeClr>
+            </a:gs>
+            <a:gs pos="100000">
+              <a:schemeClr val="phClr">
+                <a:lumMod val="99000"/>
+                <a:satMod val="120000"/>
+                <a:shade val="78000"/>
+              </a:schemeClr>
+            </a:gs>
+          </a:gsLst>
+          <a:lin ang="5400000" scaled="0"/>
+        </a:gradFill>
+      </a:fillStyleLst>
+      <a:lnStyleLst>
+        <a:ln w="6350" cap="flat" cmpd="sng" algn="ctr">
+          <a:solidFill>
+            <a:schemeClr val="phClr"/>
+          </a:solidFill>
+          <a:prstDash val="solid"/>
+          <a:miter lim="800000"/>
+        </a:ln>
+        <a:ln w="12700" cap="flat" cmpd="sng" algn="ctr">
+          <a:solidFill>
+            <a:schemeClr val="phClr"/>
+          </a:solidFill>
+          <a:prstDash val="solid"/>
+          <a:miter lim="800000"/>
+        </a:ln>
+        <a:ln w="19050" cap="flat" cmpd="sng" algn="ctr">
+          <a:solidFill>
+            <a:schemeClr val="phClr"/>
+          </a:solidFill>
+          <a:prstDash val="solid"/>
+          <a:miter lim="800000"/>
+        </a:ln>
+      </a:lnStyleLst>
+      <a:effectStyleLst>
+        <a:effectStyle>
+          <a:effectLst/>
+        </a:effectStyle>
+        <a:effectStyle>
+          <a:effectLst/>
+        </a:effectStyle>
+        <a:effectStyle>
+          <a:effectLst>
+            <a:outerShdw blurRad="57150" dist="19050" dir="5400000" algn="ctr" rotWithShape="0">
+              <a:srgbClr val="000000">
+                <a:alpha val="63000"/>
+              </a:srgbClr>
+            </a:outerShdw>
+          </a:effectLst>
+        </a:effectStyle>
+      </a:effectStyleLst>
+      <a:bgFillStyleLst>
+        <a:solidFill>
+          <a:schemeClr val="phClr"/>
+        </a:solidFill>
+        <a:solidFill>
+          <a:schemeClr val="phClr">
+            <a:tint val="95000"/>
+            <a:satMod val="170000"/>
+          </a:schemeClr>
+        </a:solidFill>
+        <a:gradFill rotWithShape="1">
+          <a:gsLst>
+            <a:gs pos="0">
+              <a:schemeClr val="phClr">
+                <a:tint val="93000"/>
+                <a:satMod val="150000"/>
+                <a:shade val="98000"/>
+                <a:lumMod val="102000"/>
+              </a:schemeClr>
+            </a:gs>
+            <a:gs pos="50000">
+              <a:schemeClr val="phClr">
+                <a:tint val="98000"/>
+                <a:satMod val="130000"/>
+                <a:shade val="90000"/>
+                <a:lumMod val="103000"/>
+              </a:schemeClr>
+            </a:gs>
+            <a:gs pos="100000">
+              <a:schemeClr val="phClr">
+                <a:shade val="63000"/>
+                <a:satMod val="120000"/>
+              </a:schemeClr>
+            </a:gs>
+          </a:gsLst>
+          <a:lin ang="5400000" scaled="0"/>
+        </a:gradFill>
+      </a:bgFillStyleLst>
+    </a:fmtScheme>
+  </a:themeElements>
+  <a:objectDefaults/>
+  <a:extraClrSchemeLst/>
+  <a:extLst>
+    <a:ext uri="{05A4C25C-085E-4340-85A3-A5531E510DB2}">
+      <thm15:themeFamily xmlns:thm15="http://schemas.microsoft.com/office/thememl/2012/main" name="Office Theme" id="{62F939B6-93AF-4DB8-9C6B-D6C7DFDC589F}" vid="{4A3C46E8-61CC-4603-A589-7422A47A8E4A}"/>
+    </a:ext>
+  </a:extLst>
+</a:theme>
 </file>
</xml_diff>